<commit_message>
I changed a flow chart. Please Check and message me
</commit_message>
<xml_diff>
--- a/project/ux/ux 디자인.pptx
+++ b/project/ux/ux 디자인.pptx
@@ -146,7 +146,7 @@
           <p:cNvPr id="2" name="제목 1">
             <a:extLst>
               <a:ext uri="{FF2B5EF4-FFF2-40B4-BE49-F238E27FC236}">
-                <a16:creationId xmlns:a16="http://schemas.microsoft.com/office/drawing/2014/main" id="{6132674E-6DB0-4F29-9A88-761AA61E89FC}"/>
+                <a16:creationId xmlns:a16="http://schemas.microsoft.com/office/drawing/2014/main" xmlns="" id="{6132674E-6DB0-4F29-9A88-761AA61E89FC}"/>
               </a:ext>
             </a:extLst>
           </p:cNvPr>
@@ -183,7 +183,7 @@
           <p:cNvPr id="3" name="부제목 2">
             <a:extLst>
               <a:ext uri="{FF2B5EF4-FFF2-40B4-BE49-F238E27FC236}">
-                <a16:creationId xmlns:a16="http://schemas.microsoft.com/office/drawing/2014/main" id="{A73682D2-7E33-4F8D-AC77-6E2F712010B8}"/>
+                <a16:creationId xmlns:a16="http://schemas.microsoft.com/office/drawing/2014/main" xmlns="" id="{A73682D2-7E33-4F8D-AC77-6E2F712010B8}"/>
               </a:ext>
             </a:extLst>
           </p:cNvPr>
@@ -253,7 +253,7 @@
           <p:cNvPr id="4" name="날짜 개체 틀 3">
             <a:extLst>
               <a:ext uri="{FF2B5EF4-FFF2-40B4-BE49-F238E27FC236}">
-                <a16:creationId xmlns:a16="http://schemas.microsoft.com/office/drawing/2014/main" id="{03E7F4D9-7C3A-432D-85FD-60B820D0C75E}"/>
+                <a16:creationId xmlns:a16="http://schemas.microsoft.com/office/drawing/2014/main" xmlns="" id="{03E7F4D9-7C3A-432D-85FD-60B820D0C75E}"/>
               </a:ext>
             </a:extLst>
           </p:cNvPr>
@@ -282,7 +282,7 @@
           <p:cNvPr id="5" name="바닥글 개체 틀 4">
             <a:extLst>
               <a:ext uri="{FF2B5EF4-FFF2-40B4-BE49-F238E27FC236}">
-                <a16:creationId xmlns:a16="http://schemas.microsoft.com/office/drawing/2014/main" id="{6A04B928-C247-41C4-A915-B001CB0465FB}"/>
+                <a16:creationId xmlns:a16="http://schemas.microsoft.com/office/drawing/2014/main" xmlns="" id="{6A04B928-C247-41C4-A915-B001CB0465FB}"/>
               </a:ext>
             </a:extLst>
           </p:cNvPr>
@@ -307,7 +307,7 @@
           <p:cNvPr id="6" name="슬라이드 번호 개체 틀 5">
             <a:extLst>
               <a:ext uri="{FF2B5EF4-FFF2-40B4-BE49-F238E27FC236}">
-                <a16:creationId xmlns:a16="http://schemas.microsoft.com/office/drawing/2014/main" id="{D2A20632-045F-4EFB-A453-30327EBCC56E}"/>
+                <a16:creationId xmlns:a16="http://schemas.microsoft.com/office/drawing/2014/main" xmlns="" id="{D2A20632-045F-4EFB-A453-30327EBCC56E}"/>
               </a:ext>
             </a:extLst>
           </p:cNvPr>
@@ -366,7 +366,7 @@
           <p:cNvPr id="2" name="제목 1">
             <a:extLst>
               <a:ext uri="{FF2B5EF4-FFF2-40B4-BE49-F238E27FC236}">
-                <a16:creationId xmlns:a16="http://schemas.microsoft.com/office/drawing/2014/main" id="{D66BE897-C2B2-4C47-8B27-D80136F10930}"/>
+                <a16:creationId xmlns:a16="http://schemas.microsoft.com/office/drawing/2014/main" xmlns="" id="{D66BE897-C2B2-4C47-8B27-D80136F10930}"/>
               </a:ext>
             </a:extLst>
           </p:cNvPr>
@@ -394,7 +394,7 @@
           <p:cNvPr id="3" name="세로 텍스트 개체 틀 2">
             <a:extLst>
               <a:ext uri="{FF2B5EF4-FFF2-40B4-BE49-F238E27FC236}">
-                <a16:creationId xmlns:a16="http://schemas.microsoft.com/office/drawing/2014/main" id="{C218157E-90A1-4E27-866F-0D27DD9F980B}"/>
+                <a16:creationId xmlns:a16="http://schemas.microsoft.com/office/drawing/2014/main" xmlns="" id="{C218157E-90A1-4E27-866F-0D27DD9F980B}"/>
               </a:ext>
             </a:extLst>
           </p:cNvPr>
@@ -451,7 +451,7 @@
           <p:cNvPr id="4" name="날짜 개체 틀 3">
             <a:extLst>
               <a:ext uri="{FF2B5EF4-FFF2-40B4-BE49-F238E27FC236}">
-                <a16:creationId xmlns:a16="http://schemas.microsoft.com/office/drawing/2014/main" id="{700ADDD3-3D56-4CE0-B5DD-F7E2D0DAEB7F}"/>
+                <a16:creationId xmlns:a16="http://schemas.microsoft.com/office/drawing/2014/main" xmlns="" id="{700ADDD3-3D56-4CE0-B5DD-F7E2D0DAEB7F}"/>
               </a:ext>
             </a:extLst>
           </p:cNvPr>
@@ -480,7 +480,7 @@
           <p:cNvPr id="5" name="바닥글 개체 틀 4">
             <a:extLst>
               <a:ext uri="{FF2B5EF4-FFF2-40B4-BE49-F238E27FC236}">
-                <a16:creationId xmlns:a16="http://schemas.microsoft.com/office/drawing/2014/main" id="{78FC38BC-62AA-427E-8388-2AD1B6547561}"/>
+                <a16:creationId xmlns:a16="http://schemas.microsoft.com/office/drawing/2014/main" xmlns="" id="{78FC38BC-62AA-427E-8388-2AD1B6547561}"/>
               </a:ext>
             </a:extLst>
           </p:cNvPr>
@@ -505,7 +505,7 @@
           <p:cNvPr id="6" name="슬라이드 번호 개체 틀 5">
             <a:extLst>
               <a:ext uri="{FF2B5EF4-FFF2-40B4-BE49-F238E27FC236}">
-                <a16:creationId xmlns:a16="http://schemas.microsoft.com/office/drawing/2014/main" id="{2FDB24DA-8908-4956-AEFA-1A53AEFEDECD}"/>
+                <a16:creationId xmlns:a16="http://schemas.microsoft.com/office/drawing/2014/main" xmlns="" id="{2FDB24DA-8908-4956-AEFA-1A53AEFEDECD}"/>
               </a:ext>
             </a:extLst>
           </p:cNvPr>
@@ -564,7 +564,7 @@
           <p:cNvPr id="2" name="세로 제목 1">
             <a:extLst>
               <a:ext uri="{FF2B5EF4-FFF2-40B4-BE49-F238E27FC236}">
-                <a16:creationId xmlns:a16="http://schemas.microsoft.com/office/drawing/2014/main" id="{2E5D269E-78DF-408F-AED2-CA5F454261A3}"/>
+                <a16:creationId xmlns:a16="http://schemas.microsoft.com/office/drawing/2014/main" xmlns="" id="{2E5D269E-78DF-408F-AED2-CA5F454261A3}"/>
               </a:ext>
             </a:extLst>
           </p:cNvPr>
@@ -597,7 +597,7 @@
           <p:cNvPr id="3" name="세로 텍스트 개체 틀 2">
             <a:extLst>
               <a:ext uri="{FF2B5EF4-FFF2-40B4-BE49-F238E27FC236}">
-                <a16:creationId xmlns:a16="http://schemas.microsoft.com/office/drawing/2014/main" id="{91BB0F85-A93E-47F5-9F50-2B8CBC9BE240}"/>
+                <a16:creationId xmlns:a16="http://schemas.microsoft.com/office/drawing/2014/main" xmlns="" id="{91BB0F85-A93E-47F5-9F50-2B8CBC9BE240}"/>
               </a:ext>
             </a:extLst>
           </p:cNvPr>
@@ -659,7 +659,7 @@
           <p:cNvPr id="4" name="날짜 개체 틀 3">
             <a:extLst>
               <a:ext uri="{FF2B5EF4-FFF2-40B4-BE49-F238E27FC236}">
-                <a16:creationId xmlns:a16="http://schemas.microsoft.com/office/drawing/2014/main" id="{1FFECC0B-9038-4024-AD8F-89DCE7D217A7}"/>
+                <a16:creationId xmlns:a16="http://schemas.microsoft.com/office/drawing/2014/main" xmlns="" id="{1FFECC0B-9038-4024-AD8F-89DCE7D217A7}"/>
               </a:ext>
             </a:extLst>
           </p:cNvPr>
@@ -688,7 +688,7 @@
           <p:cNvPr id="5" name="바닥글 개체 틀 4">
             <a:extLst>
               <a:ext uri="{FF2B5EF4-FFF2-40B4-BE49-F238E27FC236}">
-                <a16:creationId xmlns:a16="http://schemas.microsoft.com/office/drawing/2014/main" id="{CCF32A53-F2A0-4E69-BF05-B58BA95E9DE4}"/>
+                <a16:creationId xmlns:a16="http://schemas.microsoft.com/office/drawing/2014/main" xmlns="" id="{CCF32A53-F2A0-4E69-BF05-B58BA95E9DE4}"/>
               </a:ext>
             </a:extLst>
           </p:cNvPr>
@@ -713,7 +713,7 @@
           <p:cNvPr id="6" name="슬라이드 번호 개체 틀 5">
             <a:extLst>
               <a:ext uri="{FF2B5EF4-FFF2-40B4-BE49-F238E27FC236}">
-                <a16:creationId xmlns:a16="http://schemas.microsoft.com/office/drawing/2014/main" id="{38A53D74-92CE-4C9D-BE84-2E0100F8448D}"/>
+                <a16:creationId xmlns:a16="http://schemas.microsoft.com/office/drawing/2014/main" xmlns="" id="{38A53D74-92CE-4C9D-BE84-2E0100F8448D}"/>
               </a:ext>
             </a:extLst>
           </p:cNvPr>
@@ -772,7 +772,7 @@
           <p:cNvPr id="2" name="제목 1">
             <a:extLst>
               <a:ext uri="{FF2B5EF4-FFF2-40B4-BE49-F238E27FC236}">
-                <a16:creationId xmlns:a16="http://schemas.microsoft.com/office/drawing/2014/main" id="{7659B837-7A6C-4434-8565-D30A1184C14F}"/>
+                <a16:creationId xmlns:a16="http://schemas.microsoft.com/office/drawing/2014/main" xmlns="" id="{7659B837-7A6C-4434-8565-D30A1184C14F}"/>
               </a:ext>
             </a:extLst>
           </p:cNvPr>
@@ -800,7 +800,7 @@
           <p:cNvPr id="3" name="내용 개체 틀 2">
             <a:extLst>
               <a:ext uri="{FF2B5EF4-FFF2-40B4-BE49-F238E27FC236}">
-                <a16:creationId xmlns:a16="http://schemas.microsoft.com/office/drawing/2014/main" id="{EB9C9F62-6136-4A16-BC7E-9683344DC983}"/>
+                <a16:creationId xmlns:a16="http://schemas.microsoft.com/office/drawing/2014/main" xmlns="" id="{EB9C9F62-6136-4A16-BC7E-9683344DC983}"/>
               </a:ext>
             </a:extLst>
           </p:cNvPr>
@@ -857,7 +857,7 @@
           <p:cNvPr id="4" name="날짜 개체 틀 3">
             <a:extLst>
               <a:ext uri="{FF2B5EF4-FFF2-40B4-BE49-F238E27FC236}">
-                <a16:creationId xmlns:a16="http://schemas.microsoft.com/office/drawing/2014/main" id="{A6DD54C3-8EED-44FD-9CF2-DC897181BB02}"/>
+                <a16:creationId xmlns:a16="http://schemas.microsoft.com/office/drawing/2014/main" xmlns="" id="{A6DD54C3-8EED-44FD-9CF2-DC897181BB02}"/>
               </a:ext>
             </a:extLst>
           </p:cNvPr>
@@ -886,7 +886,7 @@
           <p:cNvPr id="5" name="바닥글 개체 틀 4">
             <a:extLst>
               <a:ext uri="{FF2B5EF4-FFF2-40B4-BE49-F238E27FC236}">
-                <a16:creationId xmlns:a16="http://schemas.microsoft.com/office/drawing/2014/main" id="{FDB385F2-766C-49C9-BD2C-F4CFFE515541}"/>
+                <a16:creationId xmlns:a16="http://schemas.microsoft.com/office/drawing/2014/main" xmlns="" id="{FDB385F2-766C-49C9-BD2C-F4CFFE515541}"/>
               </a:ext>
             </a:extLst>
           </p:cNvPr>
@@ -911,7 +911,7 @@
           <p:cNvPr id="6" name="슬라이드 번호 개체 틀 5">
             <a:extLst>
               <a:ext uri="{FF2B5EF4-FFF2-40B4-BE49-F238E27FC236}">
-                <a16:creationId xmlns:a16="http://schemas.microsoft.com/office/drawing/2014/main" id="{A86D6FE6-6B8A-45B4-934A-244EC11C5B9F}"/>
+                <a16:creationId xmlns:a16="http://schemas.microsoft.com/office/drawing/2014/main" xmlns="" id="{A86D6FE6-6B8A-45B4-934A-244EC11C5B9F}"/>
               </a:ext>
             </a:extLst>
           </p:cNvPr>
@@ -970,7 +970,7 @@
           <p:cNvPr id="2" name="제목 1">
             <a:extLst>
               <a:ext uri="{FF2B5EF4-FFF2-40B4-BE49-F238E27FC236}">
-                <a16:creationId xmlns:a16="http://schemas.microsoft.com/office/drawing/2014/main" id="{3DE84662-493A-4377-BEA5-CA06032A8559}"/>
+                <a16:creationId xmlns:a16="http://schemas.microsoft.com/office/drawing/2014/main" xmlns="" id="{3DE84662-493A-4377-BEA5-CA06032A8559}"/>
               </a:ext>
             </a:extLst>
           </p:cNvPr>
@@ -1007,7 +1007,7 @@
           <p:cNvPr id="3" name="텍스트 개체 틀 2">
             <a:extLst>
               <a:ext uri="{FF2B5EF4-FFF2-40B4-BE49-F238E27FC236}">
-                <a16:creationId xmlns:a16="http://schemas.microsoft.com/office/drawing/2014/main" id="{55DC545D-EE63-41AB-983E-6D7E015B25C6}"/>
+                <a16:creationId xmlns:a16="http://schemas.microsoft.com/office/drawing/2014/main" xmlns="" id="{55DC545D-EE63-41AB-983E-6D7E015B25C6}"/>
               </a:ext>
             </a:extLst>
           </p:cNvPr>
@@ -1132,7 +1132,7 @@
           <p:cNvPr id="4" name="날짜 개체 틀 3">
             <a:extLst>
               <a:ext uri="{FF2B5EF4-FFF2-40B4-BE49-F238E27FC236}">
-                <a16:creationId xmlns:a16="http://schemas.microsoft.com/office/drawing/2014/main" id="{A5E80717-E072-4624-AE59-F1BF218F4AB2}"/>
+                <a16:creationId xmlns:a16="http://schemas.microsoft.com/office/drawing/2014/main" xmlns="" id="{A5E80717-E072-4624-AE59-F1BF218F4AB2}"/>
               </a:ext>
             </a:extLst>
           </p:cNvPr>
@@ -1161,7 +1161,7 @@
           <p:cNvPr id="5" name="바닥글 개체 틀 4">
             <a:extLst>
               <a:ext uri="{FF2B5EF4-FFF2-40B4-BE49-F238E27FC236}">
-                <a16:creationId xmlns:a16="http://schemas.microsoft.com/office/drawing/2014/main" id="{1760F6EC-24E5-409E-B08E-A59D7179CC13}"/>
+                <a16:creationId xmlns:a16="http://schemas.microsoft.com/office/drawing/2014/main" xmlns="" id="{1760F6EC-24E5-409E-B08E-A59D7179CC13}"/>
               </a:ext>
             </a:extLst>
           </p:cNvPr>
@@ -1186,7 +1186,7 @@
           <p:cNvPr id="6" name="슬라이드 번호 개체 틀 5">
             <a:extLst>
               <a:ext uri="{FF2B5EF4-FFF2-40B4-BE49-F238E27FC236}">
-                <a16:creationId xmlns:a16="http://schemas.microsoft.com/office/drawing/2014/main" id="{775004FF-5EA4-4EA0-84F2-587E57A7055D}"/>
+                <a16:creationId xmlns:a16="http://schemas.microsoft.com/office/drawing/2014/main" xmlns="" id="{775004FF-5EA4-4EA0-84F2-587E57A7055D}"/>
               </a:ext>
             </a:extLst>
           </p:cNvPr>
@@ -1245,7 +1245,7 @@
           <p:cNvPr id="2" name="제목 1">
             <a:extLst>
               <a:ext uri="{FF2B5EF4-FFF2-40B4-BE49-F238E27FC236}">
-                <a16:creationId xmlns:a16="http://schemas.microsoft.com/office/drawing/2014/main" id="{968B4831-7B31-4297-9737-ECC70F70CFB6}"/>
+                <a16:creationId xmlns:a16="http://schemas.microsoft.com/office/drawing/2014/main" xmlns="" id="{968B4831-7B31-4297-9737-ECC70F70CFB6}"/>
               </a:ext>
             </a:extLst>
           </p:cNvPr>
@@ -1273,7 +1273,7 @@
           <p:cNvPr id="3" name="내용 개체 틀 2">
             <a:extLst>
               <a:ext uri="{FF2B5EF4-FFF2-40B4-BE49-F238E27FC236}">
-                <a16:creationId xmlns:a16="http://schemas.microsoft.com/office/drawing/2014/main" id="{70CCB293-3867-4A69-879C-CE3F4BA43246}"/>
+                <a16:creationId xmlns:a16="http://schemas.microsoft.com/office/drawing/2014/main" xmlns="" id="{70CCB293-3867-4A69-879C-CE3F4BA43246}"/>
               </a:ext>
             </a:extLst>
           </p:cNvPr>
@@ -1335,7 +1335,7 @@
           <p:cNvPr id="4" name="내용 개체 틀 3">
             <a:extLst>
               <a:ext uri="{FF2B5EF4-FFF2-40B4-BE49-F238E27FC236}">
-                <a16:creationId xmlns:a16="http://schemas.microsoft.com/office/drawing/2014/main" id="{85E2DB7A-5373-41E6-894F-43B260885720}"/>
+                <a16:creationId xmlns:a16="http://schemas.microsoft.com/office/drawing/2014/main" xmlns="" id="{85E2DB7A-5373-41E6-894F-43B260885720}"/>
               </a:ext>
             </a:extLst>
           </p:cNvPr>
@@ -1397,7 +1397,7 @@
           <p:cNvPr id="5" name="날짜 개체 틀 4">
             <a:extLst>
               <a:ext uri="{FF2B5EF4-FFF2-40B4-BE49-F238E27FC236}">
-                <a16:creationId xmlns:a16="http://schemas.microsoft.com/office/drawing/2014/main" id="{CAD3A554-BFDA-445B-A800-578CC97D65AF}"/>
+                <a16:creationId xmlns:a16="http://schemas.microsoft.com/office/drawing/2014/main" xmlns="" id="{CAD3A554-BFDA-445B-A800-578CC97D65AF}"/>
               </a:ext>
             </a:extLst>
           </p:cNvPr>
@@ -1426,7 +1426,7 @@
           <p:cNvPr id="6" name="바닥글 개체 틀 5">
             <a:extLst>
               <a:ext uri="{FF2B5EF4-FFF2-40B4-BE49-F238E27FC236}">
-                <a16:creationId xmlns:a16="http://schemas.microsoft.com/office/drawing/2014/main" id="{3FC81FA4-0090-4086-8A77-7753C50E533E}"/>
+                <a16:creationId xmlns:a16="http://schemas.microsoft.com/office/drawing/2014/main" xmlns="" id="{3FC81FA4-0090-4086-8A77-7753C50E533E}"/>
               </a:ext>
             </a:extLst>
           </p:cNvPr>
@@ -1451,7 +1451,7 @@
           <p:cNvPr id="7" name="슬라이드 번호 개체 틀 6">
             <a:extLst>
               <a:ext uri="{FF2B5EF4-FFF2-40B4-BE49-F238E27FC236}">
-                <a16:creationId xmlns:a16="http://schemas.microsoft.com/office/drawing/2014/main" id="{A5DF257A-8C56-4388-8D32-50C8B113FBAB}"/>
+                <a16:creationId xmlns:a16="http://schemas.microsoft.com/office/drawing/2014/main" xmlns="" id="{A5DF257A-8C56-4388-8D32-50C8B113FBAB}"/>
               </a:ext>
             </a:extLst>
           </p:cNvPr>
@@ -1510,7 +1510,7 @@
           <p:cNvPr id="2" name="제목 1">
             <a:extLst>
               <a:ext uri="{FF2B5EF4-FFF2-40B4-BE49-F238E27FC236}">
-                <a16:creationId xmlns:a16="http://schemas.microsoft.com/office/drawing/2014/main" id="{AD57C545-8322-4207-9FC3-FFF7C87F45E9}"/>
+                <a16:creationId xmlns:a16="http://schemas.microsoft.com/office/drawing/2014/main" xmlns="" id="{AD57C545-8322-4207-9FC3-FFF7C87F45E9}"/>
               </a:ext>
             </a:extLst>
           </p:cNvPr>
@@ -1543,7 +1543,7 @@
           <p:cNvPr id="3" name="텍스트 개체 틀 2">
             <a:extLst>
               <a:ext uri="{FF2B5EF4-FFF2-40B4-BE49-F238E27FC236}">
-                <a16:creationId xmlns:a16="http://schemas.microsoft.com/office/drawing/2014/main" id="{9E8D6303-81F7-489B-A543-0573A6FF2D41}"/>
+                <a16:creationId xmlns:a16="http://schemas.microsoft.com/office/drawing/2014/main" xmlns="" id="{9E8D6303-81F7-489B-A543-0573A6FF2D41}"/>
               </a:ext>
             </a:extLst>
           </p:cNvPr>
@@ -1614,7 +1614,7 @@
           <p:cNvPr id="4" name="내용 개체 틀 3">
             <a:extLst>
               <a:ext uri="{FF2B5EF4-FFF2-40B4-BE49-F238E27FC236}">
-                <a16:creationId xmlns:a16="http://schemas.microsoft.com/office/drawing/2014/main" id="{8F9BDF20-BBAD-48CA-B584-7AD12E2694D3}"/>
+                <a16:creationId xmlns:a16="http://schemas.microsoft.com/office/drawing/2014/main" xmlns="" id="{8F9BDF20-BBAD-48CA-B584-7AD12E2694D3}"/>
               </a:ext>
             </a:extLst>
           </p:cNvPr>
@@ -1676,7 +1676,7 @@
           <p:cNvPr id="5" name="텍스트 개체 틀 4">
             <a:extLst>
               <a:ext uri="{FF2B5EF4-FFF2-40B4-BE49-F238E27FC236}">
-                <a16:creationId xmlns:a16="http://schemas.microsoft.com/office/drawing/2014/main" id="{1BF96D60-47FF-4680-A50D-FD569C27496D}"/>
+                <a16:creationId xmlns:a16="http://schemas.microsoft.com/office/drawing/2014/main" xmlns="" id="{1BF96D60-47FF-4680-A50D-FD569C27496D}"/>
               </a:ext>
             </a:extLst>
           </p:cNvPr>
@@ -1747,7 +1747,7 @@
           <p:cNvPr id="6" name="내용 개체 틀 5">
             <a:extLst>
               <a:ext uri="{FF2B5EF4-FFF2-40B4-BE49-F238E27FC236}">
-                <a16:creationId xmlns:a16="http://schemas.microsoft.com/office/drawing/2014/main" id="{C0A89DF4-777D-4640-B7F4-3C7F230AF690}"/>
+                <a16:creationId xmlns:a16="http://schemas.microsoft.com/office/drawing/2014/main" xmlns="" id="{C0A89DF4-777D-4640-B7F4-3C7F230AF690}"/>
               </a:ext>
             </a:extLst>
           </p:cNvPr>
@@ -1809,7 +1809,7 @@
           <p:cNvPr id="7" name="날짜 개체 틀 6">
             <a:extLst>
               <a:ext uri="{FF2B5EF4-FFF2-40B4-BE49-F238E27FC236}">
-                <a16:creationId xmlns:a16="http://schemas.microsoft.com/office/drawing/2014/main" id="{865B49EB-DFEC-423E-94F5-B7A39B6C95F4}"/>
+                <a16:creationId xmlns:a16="http://schemas.microsoft.com/office/drawing/2014/main" xmlns="" id="{865B49EB-DFEC-423E-94F5-B7A39B6C95F4}"/>
               </a:ext>
             </a:extLst>
           </p:cNvPr>
@@ -1838,7 +1838,7 @@
           <p:cNvPr id="8" name="바닥글 개체 틀 7">
             <a:extLst>
               <a:ext uri="{FF2B5EF4-FFF2-40B4-BE49-F238E27FC236}">
-                <a16:creationId xmlns:a16="http://schemas.microsoft.com/office/drawing/2014/main" id="{3EFD901A-0801-46BC-84BB-7653BB64FB97}"/>
+                <a16:creationId xmlns:a16="http://schemas.microsoft.com/office/drawing/2014/main" xmlns="" id="{3EFD901A-0801-46BC-84BB-7653BB64FB97}"/>
               </a:ext>
             </a:extLst>
           </p:cNvPr>
@@ -1863,7 +1863,7 @@
           <p:cNvPr id="9" name="슬라이드 번호 개체 틀 8">
             <a:extLst>
               <a:ext uri="{FF2B5EF4-FFF2-40B4-BE49-F238E27FC236}">
-                <a16:creationId xmlns:a16="http://schemas.microsoft.com/office/drawing/2014/main" id="{189DC16B-047A-4DD3-BCC4-CD484940CFA2}"/>
+                <a16:creationId xmlns:a16="http://schemas.microsoft.com/office/drawing/2014/main" xmlns="" id="{189DC16B-047A-4DD3-BCC4-CD484940CFA2}"/>
               </a:ext>
             </a:extLst>
           </p:cNvPr>
@@ -1922,7 +1922,7 @@
           <p:cNvPr id="2" name="제목 1">
             <a:extLst>
               <a:ext uri="{FF2B5EF4-FFF2-40B4-BE49-F238E27FC236}">
-                <a16:creationId xmlns:a16="http://schemas.microsoft.com/office/drawing/2014/main" id="{A69691D4-14EC-493F-9A5D-D84FC56E2C61}"/>
+                <a16:creationId xmlns:a16="http://schemas.microsoft.com/office/drawing/2014/main" xmlns="" id="{A69691D4-14EC-493F-9A5D-D84FC56E2C61}"/>
               </a:ext>
             </a:extLst>
           </p:cNvPr>
@@ -1950,7 +1950,7 @@
           <p:cNvPr id="3" name="날짜 개체 틀 2">
             <a:extLst>
               <a:ext uri="{FF2B5EF4-FFF2-40B4-BE49-F238E27FC236}">
-                <a16:creationId xmlns:a16="http://schemas.microsoft.com/office/drawing/2014/main" id="{1ED0D791-C158-4BE8-B66A-897BF2CE2B31}"/>
+                <a16:creationId xmlns:a16="http://schemas.microsoft.com/office/drawing/2014/main" xmlns="" id="{1ED0D791-C158-4BE8-B66A-897BF2CE2B31}"/>
               </a:ext>
             </a:extLst>
           </p:cNvPr>
@@ -1979,7 +1979,7 @@
           <p:cNvPr id="4" name="바닥글 개체 틀 3">
             <a:extLst>
               <a:ext uri="{FF2B5EF4-FFF2-40B4-BE49-F238E27FC236}">
-                <a16:creationId xmlns:a16="http://schemas.microsoft.com/office/drawing/2014/main" id="{5284DDA6-F47A-4AE8-8E7B-F2E830A366EC}"/>
+                <a16:creationId xmlns:a16="http://schemas.microsoft.com/office/drawing/2014/main" xmlns="" id="{5284DDA6-F47A-4AE8-8E7B-F2E830A366EC}"/>
               </a:ext>
             </a:extLst>
           </p:cNvPr>
@@ -2004,7 +2004,7 @@
           <p:cNvPr id="5" name="슬라이드 번호 개체 틀 4">
             <a:extLst>
               <a:ext uri="{FF2B5EF4-FFF2-40B4-BE49-F238E27FC236}">
-                <a16:creationId xmlns:a16="http://schemas.microsoft.com/office/drawing/2014/main" id="{D5C18EF9-32F1-4DC0-97F1-AD075958A6CD}"/>
+                <a16:creationId xmlns:a16="http://schemas.microsoft.com/office/drawing/2014/main" xmlns="" id="{D5C18EF9-32F1-4DC0-97F1-AD075958A6CD}"/>
               </a:ext>
             </a:extLst>
           </p:cNvPr>
@@ -2063,7 +2063,7 @@
           <p:cNvPr id="2" name="날짜 개체 틀 1">
             <a:extLst>
               <a:ext uri="{FF2B5EF4-FFF2-40B4-BE49-F238E27FC236}">
-                <a16:creationId xmlns:a16="http://schemas.microsoft.com/office/drawing/2014/main" id="{2CFFB397-9837-4B08-8644-17B4249B6276}"/>
+                <a16:creationId xmlns:a16="http://schemas.microsoft.com/office/drawing/2014/main" xmlns="" id="{2CFFB397-9837-4B08-8644-17B4249B6276}"/>
               </a:ext>
             </a:extLst>
           </p:cNvPr>
@@ -2092,7 +2092,7 @@
           <p:cNvPr id="3" name="바닥글 개체 틀 2">
             <a:extLst>
               <a:ext uri="{FF2B5EF4-FFF2-40B4-BE49-F238E27FC236}">
-                <a16:creationId xmlns:a16="http://schemas.microsoft.com/office/drawing/2014/main" id="{D922FA8A-3244-46D2-96C3-E7C43C143462}"/>
+                <a16:creationId xmlns:a16="http://schemas.microsoft.com/office/drawing/2014/main" xmlns="" id="{D922FA8A-3244-46D2-96C3-E7C43C143462}"/>
               </a:ext>
             </a:extLst>
           </p:cNvPr>
@@ -2117,7 +2117,7 @@
           <p:cNvPr id="4" name="슬라이드 번호 개체 틀 3">
             <a:extLst>
               <a:ext uri="{FF2B5EF4-FFF2-40B4-BE49-F238E27FC236}">
-                <a16:creationId xmlns:a16="http://schemas.microsoft.com/office/drawing/2014/main" id="{3684835D-7AD9-48E4-A14E-0AA50710DA8F}"/>
+                <a16:creationId xmlns:a16="http://schemas.microsoft.com/office/drawing/2014/main" xmlns="" id="{3684835D-7AD9-48E4-A14E-0AA50710DA8F}"/>
               </a:ext>
             </a:extLst>
           </p:cNvPr>
@@ -2176,7 +2176,7 @@
           <p:cNvPr id="2" name="제목 1">
             <a:extLst>
               <a:ext uri="{FF2B5EF4-FFF2-40B4-BE49-F238E27FC236}">
-                <a16:creationId xmlns:a16="http://schemas.microsoft.com/office/drawing/2014/main" id="{EC9C0E10-E692-4BB2-B41B-B296C176816A}"/>
+                <a16:creationId xmlns:a16="http://schemas.microsoft.com/office/drawing/2014/main" xmlns="" id="{EC9C0E10-E692-4BB2-B41B-B296C176816A}"/>
               </a:ext>
             </a:extLst>
           </p:cNvPr>
@@ -2213,7 +2213,7 @@
           <p:cNvPr id="3" name="내용 개체 틀 2">
             <a:extLst>
               <a:ext uri="{FF2B5EF4-FFF2-40B4-BE49-F238E27FC236}">
-                <a16:creationId xmlns:a16="http://schemas.microsoft.com/office/drawing/2014/main" id="{15ED443F-B03D-4827-80CB-F5C37F09ABBD}"/>
+                <a16:creationId xmlns:a16="http://schemas.microsoft.com/office/drawing/2014/main" xmlns="" id="{15ED443F-B03D-4827-80CB-F5C37F09ABBD}"/>
               </a:ext>
             </a:extLst>
           </p:cNvPr>
@@ -2303,7 +2303,7 @@
           <p:cNvPr id="4" name="텍스트 개체 틀 3">
             <a:extLst>
               <a:ext uri="{FF2B5EF4-FFF2-40B4-BE49-F238E27FC236}">
-                <a16:creationId xmlns:a16="http://schemas.microsoft.com/office/drawing/2014/main" id="{923CABFD-20B8-47FD-BBC8-1B7DC556485C}"/>
+                <a16:creationId xmlns:a16="http://schemas.microsoft.com/office/drawing/2014/main" xmlns="" id="{923CABFD-20B8-47FD-BBC8-1B7DC556485C}"/>
               </a:ext>
             </a:extLst>
           </p:cNvPr>
@@ -2374,7 +2374,7 @@
           <p:cNvPr id="5" name="날짜 개체 틀 4">
             <a:extLst>
               <a:ext uri="{FF2B5EF4-FFF2-40B4-BE49-F238E27FC236}">
-                <a16:creationId xmlns:a16="http://schemas.microsoft.com/office/drawing/2014/main" id="{0889DCF5-7070-49DA-91A1-83F5A63CFBD1}"/>
+                <a16:creationId xmlns:a16="http://schemas.microsoft.com/office/drawing/2014/main" xmlns="" id="{0889DCF5-7070-49DA-91A1-83F5A63CFBD1}"/>
               </a:ext>
             </a:extLst>
           </p:cNvPr>
@@ -2403,7 +2403,7 @@
           <p:cNvPr id="6" name="바닥글 개체 틀 5">
             <a:extLst>
               <a:ext uri="{FF2B5EF4-FFF2-40B4-BE49-F238E27FC236}">
-                <a16:creationId xmlns:a16="http://schemas.microsoft.com/office/drawing/2014/main" id="{4ED8535D-E00F-4A33-830F-AE4FCBD80B18}"/>
+                <a16:creationId xmlns:a16="http://schemas.microsoft.com/office/drawing/2014/main" xmlns="" id="{4ED8535D-E00F-4A33-830F-AE4FCBD80B18}"/>
               </a:ext>
             </a:extLst>
           </p:cNvPr>
@@ -2428,7 +2428,7 @@
           <p:cNvPr id="7" name="슬라이드 번호 개체 틀 6">
             <a:extLst>
               <a:ext uri="{FF2B5EF4-FFF2-40B4-BE49-F238E27FC236}">
-                <a16:creationId xmlns:a16="http://schemas.microsoft.com/office/drawing/2014/main" id="{AFB49387-A1B8-4965-B3C2-804EEF30337C}"/>
+                <a16:creationId xmlns:a16="http://schemas.microsoft.com/office/drawing/2014/main" xmlns="" id="{AFB49387-A1B8-4965-B3C2-804EEF30337C}"/>
               </a:ext>
             </a:extLst>
           </p:cNvPr>
@@ -2487,7 +2487,7 @@
           <p:cNvPr id="2" name="제목 1">
             <a:extLst>
               <a:ext uri="{FF2B5EF4-FFF2-40B4-BE49-F238E27FC236}">
-                <a16:creationId xmlns:a16="http://schemas.microsoft.com/office/drawing/2014/main" id="{E1CA7442-8035-4A7A-A874-D9CD2B6D5D81}"/>
+                <a16:creationId xmlns:a16="http://schemas.microsoft.com/office/drawing/2014/main" xmlns="" id="{E1CA7442-8035-4A7A-A874-D9CD2B6D5D81}"/>
               </a:ext>
             </a:extLst>
           </p:cNvPr>
@@ -2524,7 +2524,7 @@
           <p:cNvPr id="3" name="그림 개체 틀 2">
             <a:extLst>
               <a:ext uri="{FF2B5EF4-FFF2-40B4-BE49-F238E27FC236}">
-                <a16:creationId xmlns:a16="http://schemas.microsoft.com/office/drawing/2014/main" id="{7622CE00-C426-4E56-B1EF-EEF65E5F5611}"/>
+                <a16:creationId xmlns:a16="http://schemas.microsoft.com/office/drawing/2014/main" xmlns="" id="{7622CE00-C426-4E56-B1EF-EEF65E5F5611}"/>
               </a:ext>
             </a:extLst>
           </p:cNvPr>
@@ -2591,7 +2591,7 @@
           <p:cNvPr id="4" name="텍스트 개체 틀 3">
             <a:extLst>
               <a:ext uri="{FF2B5EF4-FFF2-40B4-BE49-F238E27FC236}">
-                <a16:creationId xmlns:a16="http://schemas.microsoft.com/office/drawing/2014/main" id="{495E60F2-84CE-419E-9C9F-0278E82FA1F6}"/>
+                <a16:creationId xmlns:a16="http://schemas.microsoft.com/office/drawing/2014/main" xmlns="" id="{495E60F2-84CE-419E-9C9F-0278E82FA1F6}"/>
               </a:ext>
             </a:extLst>
           </p:cNvPr>
@@ -2662,7 +2662,7 @@
           <p:cNvPr id="5" name="날짜 개체 틀 4">
             <a:extLst>
               <a:ext uri="{FF2B5EF4-FFF2-40B4-BE49-F238E27FC236}">
-                <a16:creationId xmlns:a16="http://schemas.microsoft.com/office/drawing/2014/main" id="{F722F0C8-E1C8-4905-A976-E44E5C66ECF3}"/>
+                <a16:creationId xmlns:a16="http://schemas.microsoft.com/office/drawing/2014/main" xmlns="" id="{F722F0C8-E1C8-4905-A976-E44E5C66ECF3}"/>
               </a:ext>
             </a:extLst>
           </p:cNvPr>
@@ -2691,7 +2691,7 @@
           <p:cNvPr id="6" name="바닥글 개체 틀 5">
             <a:extLst>
               <a:ext uri="{FF2B5EF4-FFF2-40B4-BE49-F238E27FC236}">
-                <a16:creationId xmlns:a16="http://schemas.microsoft.com/office/drawing/2014/main" id="{C71FB099-70B8-4949-8CC4-4991B7D80CA5}"/>
+                <a16:creationId xmlns:a16="http://schemas.microsoft.com/office/drawing/2014/main" xmlns="" id="{C71FB099-70B8-4949-8CC4-4991B7D80CA5}"/>
               </a:ext>
             </a:extLst>
           </p:cNvPr>
@@ -2716,7 +2716,7 @@
           <p:cNvPr id="7" name="슬라이드 번호 개체 틀 6">
             <a:extLst>
               <a:ext uri="{FF2B5EF4-FFF2-40B4-BE49-F238E27FC236}">
-                <a16:creationId xmlns:a16="http://schemas.microsoft.com/office/drawing/2014/main" id="{10251FBF-2A69-46B4-83CB-D3BE42F3BC6E}"/>
+                <a16:creationId xmlns:a16="http://schemas.microsoft.com/office/drawing/2014/main" xmlns="" id="{10251FBF-2A69-46B4-83CB-D3BE42F3BC6E}"/>
               </a:ext>
             </a:extLst>
           </p:cNvPr>
@@ -2780,7 +2780,7 @@
           <p:cNvPr id="2" name="제목 개체 틀 1">
             <a:extLst>
               <a:ext uri="{FF2B5EF4-FFF2-40B4-BE49-F238E27FC236}">
-                <a16:creationId xmlns:a16="http://schemas.microsoft.com/office/drawing/2014/main" id="{EFD96383-E15A-4F35-8C81-8811376A662C}"/>
+                <a16:creationId xmlns:a16="http://schemas.microsoft.com/office/drawing/2014/main" xmlns="" id="{EFD96383-E15A-4F35-8C81-8811376A662C}"/>
               </a:ext>
             </a:extLst>
           </p:cNvPr>
@@ -2818,7 +2818,7 @@
           <p:cNvPr id="3" name="텍스트 개체 틀 2">
             <a:extLst>
               <a:ext uri="{FF2B5EF4-FFF2-40B4-BE49-F238E27FC236}">
-                <a16:creationId xmlns:a16="http://schemas.microsoft.com/office/drawing/2014/main" id="{3039CF5D-F915-44BA-9FD0-88DF7342D48E}"/>
+                <a16:creationId xmlns:a16="http://schemas.microsoft.com/office/drawing/2014/main" xmlns="" id="{3039CF5D-F915-44BA-9FD0-88DF7342D48E}"/>
               </a:ext>
             </a:extLst>
           </p:cNvPr>
@@ -2885,7 +2885,7 @@
           <p:cNvPr id="4" name="날짜 개체 틀 3">
             <a:extLst>
               <a:ext uri="{FF2B5EF4-FFF2-40B4-BE49-F238E27FC236}">
-                <a16:creationId xmlns:a16="http://schemas.microsoft.com/office/drawing/2014/main" id="{0D22F11B-2A3D-4DA4-ADD8-6DA62431D684}"/>
+                <a16:creationId xmlns:a16="http://schemas.microsoft.com/office/drawing/2014/main" xmlns="" id="{0D22F11B-2A3D-4DA4-ADD8-6DA62431D684}"/>
               </a:ext>
             </a:extLst>
           </p:cNvPr>
@@ -2932,7 +2932,7 @@
           <p:cNvPr id="5" name="바닥글 개체 틀 4">
             <a:extLst>
               <a:ext uri="{FF2B5EF4-FFF2-40B4-BE49-F238E27FC236}">
-                <a16:creationId xmlns:a16="http://schemas.microsoft.com/office/drawing/2014/main" id="{8214A520-D927-4F06-92E1-2FFEF1AB4E97}"/>
+                <a16:creationId xmlns:a16="http://schemas.microsoft.com/office/drawing/2014/main" xmlns="" id="{8214A520-D927-4F06-92E1-2FFEF1AB4E97}"/>
               </a:ext>
             </a:extLst>
           </p:cNvPr>
@@ -2975,7 +2975,7 @@
           <p:cNvPr id="6" name="슬라이드 번호 개체 틀 5">
             <a:extLst>
               <a:ext uri="{FF2B5EF4-FFF2-40B4-BE49-F238E27FC236}">
-                <a16:creationId xmlns:a16="http://schemas.microsoft.com/office/drawing/2014/main" id="{8E52F654-ECB2-4687-973C-CC9C21A6FE98}"/>
+                <a16:creationId xmlns:a16="http://schemas.microsoft.com/office/drawing/2014/main" xmlns="" id="{8E52F654-ECB2-4687-973C-CC9C21A6FE98}"/>
               </a:ext>
             </a:extLst>
           </p:cNvPr>
@@ -3343,7 +3343,7 @@
           <p:cNvPr id="5" name="TextBox 4">
             <a:extLst>
               <a:ext uri="{FF2B5EF4-FFF2-40B4-BE49-F238E27FC236}">
-                <a16:creationId xmlns:a16="http://schemas.microsoft.com/office/drawing/2014/main" id="{1687122A-1A6F-42D7-B28A-CA0446A74A85}"/>
+                <a16:creationId xmlns:a16="http://schemas.microsoft.com/office/drawing/2014/main" xmlns="" id="{1687122A-1A6F-42D7-B28A-CA0446A74A85}"/>
               </a:ext>
             </a:extLst>
           </p:cNvPr>
@@ -3387,7 +3387,7 @@
           <p:cNvPr id="6" name="TextBox 5">
             <a:extLst>
               <a:ext uri="{FF2B5EF4-FFF2-40B4-BE49-F238E27FC236}">
-                <a16:creationId xmlns:a16="http://schemas.microsoft.com/office/drawing/2014/main" id="{61814FDB-3A10-4CAE-A101-A4D783960531}"/>
+                <a16:creationId xmlns:a16="http://schemas.microsoft.com/office/drawing/2014/main" xmlns="" id="{61814FDB-3A10-4CAE-A101-A4D783960531}"/>
               </a:ext>
             </a:extLst>
           </p:cNvPr>
@@ -3552,7 +3552,7 @@
           <p:cNvPr id="7" name="TextBox 6">
             <a:extLst>
               <a:ext uri="{FF2B5EF4-FFF2-40B4-BE49-F238E27FC236}">
-                <a16:creationId xmlns:a16="http://schemas.microsoft.com/office/drawing/2014/main" id="{4437C0AC-FF21-434A-B3E5-1D425393A8CC}"/>
+                <a16:creationId xmlns:a16="http://schemas.microsoft.com/office/drawing/2014/main" xmlns="" id="{4437C0AC-FF21-434A-B3E5-1D425393A8CC}"/>
               </a:ext>
             </a:extLst>
           </p:cNvPr>
@@ -3617,7 +3617,7 @@
           <p:cNvPr id="2" name="제목 1">
             <a:extLst>
               <a:ext uri="{FF2B5EF4-FFF2-40B4-BE49-F238E27FC236}">
-                <a16:creationId xmlns:a16="http://schemas.microsoft.com/office/drawing/2014/main" id="{004B6B19-4B0F-4D9E-AA2E-2D93DBE1FDE8}"/>
+                <a16:creationId xmlns:a16="http://schemas.microsoft.com/office/drawing/2014/main" xmlns="" id="{004B6B19-4B0F-4D9E-AA2E-2D93DBE1FDE8}"/>
               </a:ext>
             </a:extLst>
           </p:cNvPr>
@@ -3645,7 +3645,7 @@
           <p:cNvPr id="4" name="내용 개체 틀 3">
             <a:extLst>
               <a:ext uri="{FF2B5EF4-FFF2-40B4-BE49-F238E27FC236}">
-                <a16:creationId xmlns:a16="http://schemas.microsoft.com/office/drawing/2014/main" id="{6CC133D3-1D69-473F-8C05-5537E578312A}"/>
+                <a16:creationId xmlns:a16="http://schemas.microsoft.com/office/drawing/2014/main" xmlns="" id="{6CC133D3-1D69-473F-8C05-5537E578312A}"/>
               </a:ext>
             </a:extLst>
           </p:cNvPr>
@@ -3675,7 +3675,7 @@
           <p:cNvPr id="5" name="직사각형 4">
             <a:extLst>
               <a:ext uri="{FF2B5EF4-FFF2-40B4-BE49-F238E27FC236}">
-                <a16:creationId xmlns:a16="http://schemas.microsoft.com/office/drawing/2014/main" id="{8783E420-3634-4577-A5F3-DE3C8F46E103}"/>
+                <a16:creationId xmlns:a16="http://schemas.microsoft.com/office/drawing/2014/main" xmlns="" id="{8783E420-3634-4577-A5F3-DE3C8F46E103}"/>
               </a:ext>
             </a:extLst>
           </p:cNvPr>
@@ -3731,7 +3731,7 @@
           <p:cNvPr id="6" name="표 5">
             <a:extLst>
               <a:ext uri="{FF2B5EF4-FFF2-40B4-BE49-F238E27FC236}">
-                <a16:creationId xmlns:a16="http://schemas.microsoft.com/office/drawing/2014/main" id="{C9997A80-668F-48A8-80B1-1CFC6A5C7AB4}"/>
+                <a16:creationId xmlns:a16="http://schemas.microsoft.com/office/drawing/2014/main" xmlns="" id="{C9997A80-668F-48A8-80B1-1CFC6A5C7AB4}"/>
               </a:ext>
             </a:extLst>
           </p:cNvPr>
@@ -3760,7 +3760,7 @@
                 <a:gridCol w="1618678">
                   <a:extLst>
                     <a:ext uri="{9D8B030D-6E8A-4147-A177-3AD203B41FA5}">
-                      <a16:colId xmlns:a16="http://schemas.microsoft.com/office/drawing/2014/main" val="2750948999"/>
+                      <a16:colId xmlns:a16="http://schemas.microsoft.com/office/drawing/2014/main" xmlns="" val="2750948999"/>
                     </a:ext>
                   </a:extLst>
                 </a:gridCol>
@@ -3782,7 +3782,7 @@
                 </a:tc>
                 <a:extLst>
                   <a:ext uri="{0D108BD9-81ED-4DB2-BD59-A6C34878D82A}">
-                    <a16:rowId xmlns:a16="http://schemas.microsoft.com/office/drawing/2014/main" val="3884695047"/>
+                    <a16:rowId xmlns:a16="http://schemas.microsoft.com/office/drawing/2014/main" xmlns="" val="3884695047"/>
                   </a:ext>
                 </a:extLst>
               </a:tr>
@@ -3803,7 +3803,7 @@
                 </a:tc>
                 <a:extLst>
                   <a:ext uri="{0D108BD9-81ED-4DB2-BD59-A6C34878D82A}">
-                    <a16:rowId xmlns:a16="http://schemas.microsoft.com/office/drawing/2014/main" val="3546185854"/>
+                    <a16:rowId xmlns:a16="http://schemas.microsoft.com/office/drawing/2014/main" xmlns="" val="3546185854"/>
                   </a:ext>
                 </a:extLst>
               </a:tr>
@@ -3824,7 +3824,7 @@
                 </a:tc>
                 <a:extLst>
                   <a:ext uri="{0D108BD9-81ED-4DB2-BD59-A6C34878D82A}">
-                    <a16:rowId xmlns:a16="http://schemas.microsoft.com/office/drawing/2014/main" val="3600756719"/>
+                    <a16:rowId xmlns:a16="http://schemas.microsoft.com/office/drawing/2014/main" xmlns="" val="3600756719"/>
                   </a:ext>
                 </a:extLst>
               </a:tr>
@@ -3845,7 +3845,7 @@
                 </a:tc>
                 <a:extLst>
                   <a:ext uri="{0D108BD9-81ED-4DB2-BD59-A6C34878D82A}">
-                    <a16:rowId xmlns:a16="http://schemas.microsoft.com/office/drawing/2014/main" val="2952049210"/>
+                    <a16:rowId xmlns:a16="http://schemas.microsoft.com/office/drawing/2014/main" xmlns="" val="2952049210"/>
                   </a:ext>
                 </a:extLst>
               </a:tr>
@@ -3858,7 +3858,7 @@
           <p:cNvPr id="18" name="그림 17">
             <a:extLst>
               <a:ext uri="{FF2B5EF4-FFF2-40B4-BE49-F238E27FC236}">
-                <a16:creationId xmlns:a16="http://schemas.microsoft.com/office/drawing/2014/main" id="{A554B26D-8AC3-43D2-8E99-643BAA2ECEB3}"/>
+                <a16:creationId xmlns:a16="http://schemas.microsoft.com/office/drawing/2014/main" xmlns="" id="{A554B26D-8AC3-43D2-8E99-643BAA2ECEB3}"/>
               </a:ext>
             </a:extLst>
           </p:cNvPr>
@@ -3888,7 +3888,7 @@
           <p:cNvPr id="20" name="TextBox 19">
             <a:extLst>
               <a:ext uri="{FF2B5EF4-FFF2-40B4-BE49-F238E27FC236}">
-                <a16:creationId xmlns:a16="http://schemas.microsoft.com/office/drawing/2014/main" id="{533949C0-7155-4EDD-930B-AB4696F5C499}"/>
+                <a16:creationId xmlns:a16="http://schemas.microsoft.com/office/drawing/2014/main" xmlns="" id="{533949C0-7155-4EDD-930B-AB4696F5C499}"/>
               </a:ext>
             </a:extLst>
           </p:cNvPr>
@@ -4024,7 +4024,7 @@
           <p:cNvPr id="2" name="제목 1">
             <a:extLst>
               <a:ext uri="{FF2B5EF4-FFF2-40B4-BE49-F238E27FC236}">
-                <a16:creationId xmlns:a16="http://schemas.microsoft.com/office/drawing/2014/main" id="{98533831-1F11-4577-BE1D-683C048F248F}"/>
+                <a16:creationId xmlns:a16="http://schemas.microsoft.com/office/drawing/2014/main" xmlns="" id="{98533831-1F11-4577-BE1D-683C048F248F}"/>
               </a:ext>
             </a:extLst>
           </p:cNvPr>
@@ -4052,7 +4052,7 @@
           <p:cNvPr id="3" name="내용 개체 틀 2">
             <a:extLst>
               <a:ext uri="{FF2B5EF4-FFF2-40B4-BE49-F238E27FC236}">
-                <a16:creationId xmlns:a16="http://schemas.microsoft.com/office/drawing/2014/main" id="{4FBA18E0-6D4A-4569-B2C8-69ED727CD8BA}"/>
+                <a16:creationId xmlns:a16="http://schemas.microsoft.com/office/drawing/2014/main" xmlns="" id="{4FBA18E0-6D4A-4569-B2C8-69ED727CD8BA}"/>
               </a:ext>
             </a:extLst>
           </p:cNvPr>
@@ -4349,7 +4349,7 @@
           <p:cNvPr id="2" name="제목 1">
             <a:extLst>
               <a:ext uri="{FF2B5EF4-FFF2-40B4-BE49-F238E27FC236}">
-                <a16:creationId xmlns:a16="http://schemas.microsoft.com/office/drawing/2014/main" id="{A60C6562-9B6E-4F54-957F-C6A22BA24F5A}"/>
+                <a16:creationId xmlns:a16="http://schemas.microsoft.com/office/drawing/2014/main" xmlns="" id="{A60C6562-9B6E-4F54-957F-C6A22BA24F5A}"/>
               </a:ext>
             </a:extLst>
           </p:cNvPr>
@@ -4377,7 +4377,7 @@
           <p:cNvPr id="3" name="내용 개체 틀 2">
             <a:extLst>
               <a:ext uri="{FF2B5EF4-FFF2-40B4-BE49-F238E27FC236}">
-                <a16:creationId xmlns:a16="http://schemas.microsoft.com/office/drawing/2014/main" id="{B69CF6FA-8DE7-407F-A44E-54C4BBA17053}"/>
+                <a16:creationId xmlns:a16="http://schemas.microsoft.com/office/drawing/2014/main" xmlns="" id="{B69CF6FA-8DE7-407F-A44E-54C4BBA17053}"/>
               </a:ext>
             </a:extLst>
           </p:cNvPr>
@@ -4481,7 +4481,7 @@
           <p:cNvPr id="2" name="제목 1">
             <a:extLst>
               <a:ext uri="{FF2B5EF4-FFF2-40B4-BE49-F238E27FC236}">
-                <a16:creationId xmlns:a16="http://schemas.microsoft.com/office/drawing/2014/main" id="{BC98C92E-643E-426E-ABEC-9AC2E16ECF95}"/>
+                <a16:creationId xmlns:a16="http://schemas.microsoft.com/office/drawing/2014/main" xmlns="" id="{BC98C92E-643E-426E-ABEC-9AC2E16ECF95}"/>
               </a:ext>
             </a:extLst>
           </p:cNvPr>
@@ -4509,7 +4509,7 @@
           <p:cNvPr id="3" name="내용 개체 틀 2">
             <a:extLst>
               <a:ext uri="{FF2B5EF4-FFF2-40B4-BE49-F238E27FC236}">
-                <a16:creationId xmlns:a16="http://schemas.microsoft.com/office/drawing/2014/main" id="{FAD6D609-BAFB-4E5E-AD3C-8384CA1435B4}"/>
+                <a16:creationId xmlns:a16="http://schemas.microsoft.com/office/drawing/2014/main" xmlns="" id="{FAD6D609-BAFB-4E5E-AD3C-8384CA1435B4}"/>
               </a:ext>
             </a:extLst>
           </p:cNvPr>
@@ -4679,7 +4679,7 @@
           <p:cNvPr id="2" name="제목 1">
             <a:extLst>
               <a:ext uri="{FF2B5EF4-FFF2-40B4-BE49-F238E27FC236}">
-                <a16:creationId xmlns:a16="http://schemas.microsoft.com/office/drawing/2014/main" id="{9C453DEA-3F9E-4E77-86F9-26EAD4D40208}"/>
+                <a16:creationId xmlns:a16="http://schemas.microsoft.com/office/drawing/2014/main" xmlns="" id="{9C453DEA-3F9E-4E77-86F9-26EAD4D40208}"/>
               </a:ext>
             </a:extLst>
           </p:cNvPr>
@@ -4707,7 +4707,7 @@
           <p:cNvPr id="4" name="직사각형 3">
             <a:extLst>
               <a:ext uri="{FF2B5EF4-FFF2-40B4-BE49-F238E27FC236}">
-                <a16:creationId xmlns:a16="http://schemas.microsoft.com/office/drawing/2014/main" id="{B9D918CF-1AFD-40D5-A753-A8294AA96329}"/>
+                <a16:creationId xmlns:a16="http://schemas.microsoft.com/office/drawing/2014/main" xmlns="" id="{B9D918CF-1AFD-40D5-A753-A8294AA96329}"/>
               </a:ext>
             </a:extLst>
           </p:cNvPr>
@@ -4761,7 +4761,7 @@
           <p:cNvPr id="6" name="직사각형 5">
             <a:extLst>
               <a:ext uri="{FF2B5EF4-FFF2-40B4-BE49-F238E27FC236}">
-                <a16:creationId xmlns:a16="http://schemas.microsoft.com/office/drawing/2014/main" id="{71C8DD33-CFA0-4662-B24B-5E6F1A0AECFE}"/>
+                <a16:creationId xmlns:a16="http://schemas.microsoft.com/office/drawing/2014/main" xmlns="" id="{71C8DD33-CFA0-4662-B24B-5E6F1A0AECFE}"/>
               </a:ext>
             </a:extLst>
           </p:cNvPr>
@@ -4815,7 +4815,7 @@
           <p:cNvPr id="7" name="직사각형 6">
             <a:extLst>
               <a:ext uri="{FF2B5EF4-FFF2-40B4-BE49-F238E27FC236}">
-                <a16:creationId xmlns:a16="http://schemas.microsoft.com/office/drawing/2014/main" id="{321D4089-DBD3-456F-9369-D5989B7C72E5}"/>
+                <a16:creationId xmlns:a16="http://schemas.microsoft.com/office/drawing/2014/main" xmlns="" id="{321D4089-DBD3-456F-9369-D5989B7C72E5}"/>
               </a:ext>
             </a:extLst>
           </p:cNvPr>
@@ -4864,7 +4864,7 @@
           <p:cNvPr id="9" name="직사각형 8">
             <a:extLst>
               <a:ext uri="{FF2B5EF4-FFF2-40B4-BE49-F238E27FC236}">
-                <a16:creationId xmlns:a16="http://schemas.microsoft.com/office/drawing/2014/main" id="{59DBF39D-17FD-40E3-B10E-9A66B7CC928A}"/>
+                <a16:creationId xmlns:a16="http://schemas.microsoft.com/office/drawing/2014/main" xmlns="" id="{59DBF39D-17FD-40E3-B10E-9A66B7CC928A}"/>
               </a:ext>
             </a:extLst>
           </p:cNvPr>
@@ -4913,7 +4913,7 @@
           <p:cNvPr id="10" name="직사각형 9">
             <a:extLst>
               <a:ext uri="{FF2B5EF4-FFF2-40B4-BE49-F238E27FC236}">
-                <a16:creationId xmlns:a16="http://schemas.microsoft.com/office/drawing/2014/main" id="{3C428059-CDC7-48C0-9D51-E2B1235B3CCC}"/>
+                <a16:creationId xmlns:a16="http://schemas.microsoft.com/office/drawing/2014/main" xmlns="" id="{3C428059-CDC7-48C0-9D51-E2B1235B3CCC}"/>
               </a:ext>
             </a:extLst>
           </p:cNvPr>
@@ -4962,7 +4962,7 @@
           <p:cNvPr id="32" name="연결선: 꺾임 31">
             <a:extLst>
               <a:ext uri="{FF2B5EF4-FFF2-40B4-BE49-F238E27FC236}">
-                <a16:creationId xmlns:a16="http://schemas.microsoft.com/office/drawing/2014/main" id="{8B4654AD-E666-41B4-8E94-E247981578BD}"/>
+                <a16:creationId xmlns:a16="http://schemas.microsoft.com/office/drawing/2014/main" xmlns="" id="{8B4654AD-E666-41B4-8E94-E247981578BD}"/>
               </a:ext>
             </a:extLst>
           </p:cNvPr>
@@ -5004,7 +5004,7 @@
           <p:cNvPr id="34" name="연결선: 꺾임 33">
             <a:extLst>
               <a:ext uri="{FF2B5EF4-FFF2-40B4-BE49-F238E27FC236}">
-                <a16:creationId xmlns:a16="http://schemas.microsoft.com/office/drawing/2014/main" id="{1D746EC3-5089-4269-ADB4-3C6A520ACFBE}"/>
+                <a16:creationId xmlns:a16="http://schemas.microsoft.com/office/drawing/2014/main" xmlns="" id="{1D746EC3-5089-4269-ADB4-3C6A520ACFBE}"/>
               </a:ext>
             </a:extLst>
           </p:cNvPr>
@@ -5046,7 +5046,7 @@
           <p:cNvPr id="36" name="연결선: 꺾임 35">
             <a:extLst>
               <a:ext uri="{FF2B5EF4-FFF2-40B4-BE49-F238E27FC236}">
-                <a16:creationId xmlns:a16="http://schemas.microsoft.com/office/drawing/2014/main" id="{241A9D86-A593-4DF6-8988-429D9F091CD3}"/>
+                <a16:creationId xmlns:a16="http://schemas.microsoft.com/office/drawing/2014/main" xmlns="" id="{241A9D86-A593-4DF6-8988-429D9F091CD3}"/>
               </a:ext>
             </a:extLst>
           </p:cNvPr>
@@ -5088,7 +5088,7 @@
           <p:cNvPr id="38" name="연결선: 꺾임 37">
             <a:extLst>
               <a:ext uri="{FF2B5EF4-FFF2-40B4-BE49-F238E27FC236}">
-                <a16:creationId xmlns:a16="http://schemas.microsoft.com/office/drawing/2014/main" id="{78CFE43B-4B96-4DEE-83B4-CE323763FCF8}"/>
+                <a16:creationId xmlns:a16="http://schemas.microsoft.com/office/drawing/2014/main" xmlns="" id="{78CFE43B-4B96-4DEE-83B4-CE323763FCF8}"/>
               </a:ext>
             </a:extLst>
           </p:cNvPr>
@@ -5130,7 +5130,7 @@
           <p:cNvPr id="40" name="연결선: 꺾임 39">
             <a:extLst>
               <a:ext uri="{FF2B5EF4-FFF2-40B4-BE49-F238E27FC236}">
-                <a16:creationId xmlns:a16="http://schemas.microsoft.com/office/drawing/2014/main" id="{BF610956-03C4-45DF-82F4-1DE4757FCA4D}"/>
+                <a16:creationId xmlns:a16="http://schemas.microsoft.com/office/drawing/2014/main" xmlns="" id="{BF610956-03C4-45DF-82F4-1DE4757FCA4D}"/>
               </a:ext>
             </a:extLst>
           </p:cNvPr>
@@ -5202,7 +5202,7 @@
           <p:cNvPr id="18" name="순서도: 처리 17">
             <a:extLst>
               <a:ext uri="{FF2B5EF4-FFF2-40B4-BE49-F238E27FC236}">
-                <a16:creationId xmlns:a16="http://schemas.microsoft.com/office/drawing/2014/main" id="{511C6ADE-C057-4591-8827-8FC5883C96B2}"/>
+                <a16:creationId xmlns:a16="http://schemas.microsoft.com/office/drawing/2014/main" xmlns="" id="{511C6ADE-C057-4591-8827-8FC5883C96B2}"/>
               </a:ext>
             </a:extLst>
           </p:cNvPr>
@@ -5252,7 +5252,7 @@
           <p:cNvPr id="19" name="순서도: 처리 18">
             <a:extLst>
               <a:ext uri="{FF2B5EF4-FFF2-40B4-BE49-F238E27FC236}">
-                <a16:creationId xmlns:a16="http://schemas.microsoft.com/office/drawing/2014/main" id="{FCED0C5B-1BF3-4803-BC7D-98AF97D6E753}"/>
+                <a16:creationId xmlns:a16="http://schemas.microsoft.com/office/drawing/2014/main" xmlns="" id="{FCED0C5B-1BF3-4803-BC7D-98AF97D6E753}"/>
               </a:ext>
             </a:extLst>
           </p:cNvPr>
@@ -5302,7 +5302,7 @@
           <p:cNvPr id="20" name="순서도: 처리 19">
             <a:extLst>
               <a:ext uri="{FF2B5EF4-FFF2-40B4-BE49-F238E27FC236}">
-                <a16:creationId xmlns:a16="http://schemas.microsoft.com/office/drawing/2014/main" id="{488780A5-F517-4896-AD18-06C1737B5DD4}"/>
+                <a16:creationId xmlns:a16="http://schemas.microsoft.com/office/drawing/2014/main" xmlns="" id="{488780A5-F517-4896-AD18-06C1737B5DD4}"/>
               </a:ext>
             </a:extLst>
           </p:cNvPr>
@@ -5352,7 +5352,7 @@
           <p:cNvPr id="21" name="순서도: 판단 20">
             <a:extLst>
               <a:ext uri="{FF2B5EF4-FFF2-40B4-BE49-F238E27FC236}">
-                <a16:creationId xmlns:a16="http://schemas.microsoft.com/office/drawing/2014/main" id="{D9393A02-5792-4F96-94C5-1F84EB193CF9}"/>
+                <a16:creationId xmlns:a16="http://schemas.microsoft.com/office/drawing/2014/main" xmlns="" id="{D9393A02-5792-4F96-94C5-1F84EB193CF9}"/>
               </a:ext>
             </a:extLst>
           </p:cNvPr>
@@ -5402,7 +5402,7 @@
           <p:cNvPr id="24" name="순서도: 처리 23">
             <a:extLst>
               <a:ext uri="{FF2B5EF4-FFF2-40B4-BE49-F238E27FC236}">
-                <a16:creationId xmlns:a16="http://schemas.microsoft.com/office/drawing/2014/main" id="{F87C29D1-77E0-4777-A88C-A78BCBBFC029}"/>
+                <a16:creationId xmlns:a16="http://schemas.microsoft.com/office/drawing/2014/main" xmlns="" id="{F87C29D1-77E0-4777-A88C-A78BCBBFC029}"/>
               </a:ext>
             </a:extLst>
           </p:cNvPr>
@@ -5456,7 +5456,7 @@
           <p:cNvPr id="15" name="순서도: 판단 14">
             <a:extLst>
               <a:ext uri="{FF2B5EF4-FFF2-40B4-BE49-F238E27FC236}">
-                <a16:creationId xmlns:a16="http://schemas.microsoft.com/office/drawing/2014/main" id="{775BABEA-0B1E-474D-89EA-C4FD2A396EC2}"/>
+                <a16:creationId xmlns:a16="http://schemas.microsoft.com/office/drawing/2014/main" xmlns="" id="{775BABEA-0B1E-474D-89EA-C4FD2A396EC2}"/>
               </a:ext>
             </a:extLst>
           </p:cNvPr>
@@ -5506,7 +5506,7 @@
           <p:cNvPr id="16" name="순서도: 판단 15">
             <a:extLst>
               <a:ext uri="{FF2B5EF4-FFF2-40B4-BE49-F238E27FC236}">
-                <a16:creationId xmlns:a16="http://schemas.microsoft.com/office/drawing/2014/main" id="{A6EB6343-4924-4DEB-9E63-7F2040A9F596}"/>
+                <a16:creationId xmlns:a16="http://schemas.microsoft.com/office/drawing/2014/main" xmlns="" id="{A6EB6343-4924-4DEB-9E63-7F2040A9F596}"/>
               </a:ext>
             </a:extLst>
           </p:cNvPr>
@@ -5556,7 +5556,7 @@
           <p:cNvPr id="32" name="순서도: 처리 31">
             <a:extLst>
               <a:ext uri="{FF2B5EF4-FFF2-40B4-BE49-F238E27FC236}">
-                <a16:creationId xmlns:a16="http://schemas.microsoft.com/office/drawing/2014/main" id="{B579A163-29A1-4BBE-9FCC-BF464978503C}"/>
+                <a16:creationId xmlns:a16="http://schemas.microsoft.com/office/drawing/2014/main" xmlns="" id="{B579A163-29A1-4BBE-9FCC-BF464978503C}"/>
               </a:ext>
             </a:extLst>
           </p:cNvPr>
@@ -5606,7 +5606,7 @@
           <p:cNvPr id="33" name="순서도: 판단 32">
             <a:extLst>
               <a:ext uri="{FF2B5EF4-FFF2-40B4-BE49-F238E27FC236}">
-                <a16:creationId xmlns:a16="http://schemas.microsoft.com/office/drawing/2014/main" id="{B7FD9707-19CF-4182-B4EF-0115CC078AAF}"/>
+                <a16:creationId xmlns:a16="http://schemas.microsoft.com/office/drawing/2014/main" xmlns="" id="{B7FD9707-19CF-4182-B4EF-0115CC078AAF}"/>
               </a:ext>
             </a:extLst>
           </p:cNvPr>
@@ -5656,7 +5656,7 @@
           <p:cNvPr id="34" name="순서도: 판단 33">
             <a:extLst>
               <a:ext uri="{FF2B5EF4-FFF2-40B4-BE49-F238E27FC236}">
-                <a16:creationId xmlns:a16="http://schemas.microsoft.com/office/drawing/2014/main" id="{530AFBE7-5899-4FC6-AE8D-86D4DC7F774A}"/>
+                <a16:creationId xmlns:a16="http://schemas.microsoft.com/office/drawing/2014/main" xmlns="" id="{530AFBE7-5899-4FC6-AE8D-86D4DC7F774A}"/>
               </a:ext>
             </a:extLst>
           </p:cNvPr>
@@ -5706,7 +5706,7 @@
           <p:cNvPr id="35" name="순서도: 판단 34">
             <a:extLst>
               <a:ext uri="{FF2B5EF4-FFF2-40B4-BE49-F238E27FC236}">
-                <a16:creationId xmlns:a16="http://schemas.microsoft.com/office/drawing/2014/main" id="{B6B05B20-E958-4D01-9C1E-F39E75757B4D}"/>
+                <a16:creationId xmlns:a16="http://schemas.microsoft.com/office/drawing/2014/main" xmlns="" id="{B6B05B20-E958-4D01-9C1E-F39E75757B4D}"/>
               </a:ext>
             </a:extLst>
           </p:cNvPr>
@@ -5756,7 +5756,7 @@
           <p:cNvPr id="36" name="순서도: 처리 35">
             <a:extLst>
               <a:ext uri="{FF2B5EF4-FFF2-40B4-BE49-F238E27FC236}">
-                <a16:creationId xmlns:a16="http://schemas.microsoft.com/office/drawing/2014/main" id="{4C45B076-8A1A-40EE-90FA-37B206D6D2E9}"/>
+                <a16:creationId xmlns:a16="http://schemas.microsoft.com/office/drawing/2014/main" xmlns="" id="{4C45B076-8A1A-40EE-90FA-37B206D6D2E9}"/>
               </a:ext>
             </a:extLst>
           </p:cNvPr>
@@ -5806,7 +5806,7 @@
           <p:cNvPr id="37" name="순서도: 처리 36">
             <a:extLst>
               <a:ext uri="{FF2B5EF4-FFF2-40B4-BE49-F238E27FC236}">
-                <a16:creationId xmlns:a16="http://schemas.microsoft.com/office/drawing/2014/main" id="{7B0525B2-AA7D-4B73-86C6-C8982BF82F79}"/>
+                <a16:creationId xmlns:a16="http://schemas.microsoft.com/office/drawing/2014/main" xmlns="" id="{7B0525B2-AA7D-4B73-86C6-C8982BF82F79}"/>
               </a:ext>
             </a:extLst>
           </p:cNvPr>
@@ -5856,7 +5856,7 @@
           <p:cNvPr id="39" name="순서도: 처리 38">
             <a:extLst>
               <a:ext uri="{FF2B5EF4-FFF2-40B4-BE49-F238E27FC236}">
-                <a16:creationId xmlns:a16="http://schemas.microsoft.com/office/drawing/2014/main" id="{67F0419F-C495-4588-92AE-1DA5B85941A8}"/>
+                <a16:creationId xmlns:a16="http://schemas.microsoft.com/office/drawing/2014/main" xmlns="" id="{67F0419F-C495-4588-92AE-1DA5B85941A8}"/>
               </a:ext>
             </a:extLst>
           </p:cNvPr>
@@ -5910,7 +5910,7 @@
           <p:cNvPr id="40" name="순서도: 처리 39">
             <a:extLst>
               <a:ext uri="{FF2B5EF4-FFF2-40B4-BE49-F238E27FC236}">
-                <a16:creationId xmlns:a16="http://schemas.microsoft.com/office/drawing/2014/main" id="{F299989F-B0E4-4A99-916F-8B1C535D05E0}"/>
+                <a16:creationId xmlns:a16="http://schemas.microsoft.com/office/drawing/2014/main" xmlns="" id="{F299989F-B0E4-4A99-916F-8B1C535D05E0}"/>
               </a:ext>
             </a:extLst>
           </p:cNvPr>
@@ -5972,7 +5972,7 @@
           <p:cNvPr id="3" name="직선 화살표 연결선 2">
             <a:extLst>
               <a:ext uri="{FF2B5EF4-FFF2-40B4-BE49-F238E27FC236}">
-                <a16:creationId xmlns:a16="http://schemas.microsoft.com/office/drawing/2014/main" id="{95634405-84E6-4B70-9B2B-280F7672DECC}"/>
+                <a16:creationId xmlns:a16="http://schemas.microsoft.com/office/drawing/2014/main" xmlns="" id="{95634405-84E6-4B70-9B2B-280F7672DECC}"/>
               </a:ext>
             </a:extLst>
           </p:cNvPr>
@@ -6014,7 +6014,7 @@
           <p:cNvPr id="5" name="직선 화살표 연결선 4">
             <a:extLst>
               <a:ext uri="{FF2B5EF4-FFF2-40B4-BE49-F238E27FC236}">
-                <a16:creationId xmlns:a16="http://schemas.microsoft.com/office/drawing/2014/main" id="{90ADA965-EBDB-4F2C-814B-FC1F2F2CF88D}"/>
+                <a16:creationId xmlns:a16="http://schemas.microsoft.com/office/drawing/2014/main" xmlns="" id="{90ADA965-EBDB-4F2C-814B-FC1F2F2CF88D}"/>
               </a:ext>
             </a:extLst>
           </p:cNvPr>
@@ -6056,7 +6056,7 @@
           <p:cNvPr id="9" name="연결선: 꺾임 8">
             <a:extLst>
               <a:ext uri="{FF2B5EF4-FFF2-40B4-BE49-F238E27FC236}">
-                <a16:creationId xmlns:a16="http://schemas.microsoft.com/office/drawing/2014/main" id="{542D2A88-76CD-4EAA-91A0-C1C5139AAC86}"/>
+                <a16:creationId xmlns:a16="http://schemas.microsoft.com/office/drawing/2014/main" xmlns="" id="{542D2A88-76CD-4EAA-91A0-C1C5139AAC86}"/>
               </a:ext>
             </a:extLst>
           </p:cNvPr>
@@ -6101,7 +6101,7 @@
           <p:cNvPr id="11" name="직선 화살표 연결선 10">
             <a:extLst>
               <a:ext uri="{FF2B5EF4-FFF2-40B4-BE49-F238E27FC236}">
-                <a16:creationId xmlns:a16="http://schemas.microsoft.com/office/drawing/2014/main" id="{5908CC07-5A71-4AC5-9E73-795F9DE4F47A}"/>
+                <a16:creationId xmlns:a16="http://schemas.microsoft.com/office/drawing/2014/main" xmlns="" id="{5908CC07-5A71-4AC5-9E73-795F9DE4F47A}"/>
               </a:ext>
             </a:extLst>
           </p:cNvPr>
@@ -6143,7 +6143,7 @@
           <p:cNvPr id="13" name="직선 화살표 연결선 12">
             <a:extLst>
               <a:ext uri="{FF2B5EF4-FFF2-40B4-BE49-F238E27FC236}">
-                <a16:creationId xmlns:a16="http://schemas.microsoft.com/office/drawing/2014/main" id="{155D1A80-63B2-4E8F-97E8-37A43187429C}"/>
+                <a16:creationId xmlns:a16="http://schemas.microsoft.com/office/drawing/2014/main" xmlns="" id="{155D1A80-63B2-4E8F-97E8-37A43187429C}"/>
               </a:ext>
             </a:extLst>
           </p:cNvPr>
@@ -6185,7 +6185,7 @@
           <p:cNvPr id="46" name="직선 화살표 연결선 45">
             <a:extLst>
               <a:ext uri="{FF2B5EF4-FFF2-40B4-BE49-F238E27FC236}">
-                <a16:creationId xmlns:a16="http://schemas.microsoft.com/office/drawing/2014/main" id="{1B595C0F-D61B-47AE-A5B6-EDFF122C0B40}"/>
+                <a16:creationId xmlns:a16="http://schemas.microsoft.com/office/drawing/2014/main" xmlns="" id="{1B595C0F-D61B-47AE-A5B6-EDFF122C0B40}"/>
               </a:ext>
             </a:extLst>
           </p:cNvPr>
@@ -6227,7 +6227,7 @@
           <p:cNvPr id="48" name="직선 화살표 연결선 47">
             <a:extLst>
               <a:ext uri="{FF2B5EF4-FFF2-40B4-BE49-F238E27FC236}">
-                <a16:creationId xmlns:a16="http://schemas.microsoft.com/office/drawing/2014/main" id="{5E9D418F-C99C-4250-B03B-B1CAB818014D}"/>
+                <a16:creationId xmlns:a16="http://schemas.microsoft.com/office/drawing/2014/main" xmlns="" id="{5E9D418F-C99C-4250-B03B-B1CAB818014D}"/>
               </a:ext>
             </a:extLst>
           </p:cNvPr>
@@ -6269,7 +6269,7 @@
           <p:cNvPr id="50" name="직선 화살표 연결선 49">
             <a:extLst>
               <a:ext uri="{FF2B5EF4-FFF2-40B4-BE49-F238E27FC236}">
-                <a16:creationId xmlns:a16="http://schemas.microsoft.com/office/drawing/2014/main" id="{509C78DC-1C9F-4CD1-A05E-2B6FF1514966}"/>
+                <a16:creationId xmlns:a16="http://schemas.microsoft.com/office/drawing/2014/main" xmlns="" id="{509C78DC-1C9F-4CD1-A05E-2B6FF1514966}"/>
               </a:ext>
             </a:extLst>
           </p:cNvPr>
@@ -6312,7 +6312,7 @@
           <p:cNvPr id="53" name="연결선: 꺾임 52">
             <a:extLst>
               <a:ext uri="{FF2B5EF4-FFF2-40B4-BE49-F238E27FC236}">
-                <a16:creationId xmlns:a16="http://schemas.microsoft.com/office/drawing/2014/main" id="{5E7B3FD9-456C-4A78-B25A-2CB8A7524E42}"/>
+                <a16:creationId xmlns:a16="http://schemas.microsoft.com/office/drawing/2014/main" xmlns="" id="{5E7B3FD9-456C-4A78-B25A-2CB8A7524E42}"/>
               </a:ext>
             </a:extLst>
           </p:cNvPr>
@@ -6358,7 +6358,7 @@
           <p:cNvPr id="60" name="직선 화살표 연결선 59">
             <a:extLst>
               <a:ext uri="{FF2B5EF4-FFF2-40B4-BE49-F238E27FC236}">
-                <a16:creationId xmlns:a16="http://schemas.microsoft.com/office/drawing/2014/main" id="{995A42BA-60CE-4463-990E-F4C53CC11DBE}"/>
+                <a16:creationId xmlns:a16="http://schemas.microsoft.com/office/drawing/2014/main" xmlns="" id="{995A42BA-60CE-4463-990E-F4C53CC11DBE}"/>
               </a:ext>
             </a:extLst>
           </p:cNvPr>
@@ -6400,7 +6400,7 @@
           <p:cNvPr id="62" name="직선 화살표 연결선 61">
             <a:extLst>
               <a:ext uri="{FF2B5EF4-FFF2-40B4-BE49-F238E27FC236}">
-                <a16:creationId xmlns:a16="http://schemas.microsoft.com/office/drawing/2014/main" id="{B16C6626-18AE-40CE-A67F-923ADB53F66A}"/>
+                <a16:creationId xmlns:a16="http://schemas.microsoft.com/office/drawing/2014/main" xmlns="" id="{B16C6626-18AE-40CE-A67F-923ADB53F66A}"/>
               </a:ext>
             </a:extLst>
           </p:cNvPr>
@@ -6443,7 +6443,7 @@
           <p:cNvPr id="67" name="직선 화살표 연결선 66">
             <a:extLst>
               <a:ext uri="{FF2B5EF4-FFF2-40B4-BE49-F238E27FC236}">
-                <a16:creationId xmlns:a16="http://schemas.microsoft.com/office/drawing/2014/main" id="{E725A64C-C931-4DB5-AE3F-0161AE436200}"/>
+                <a16:creationId xmlns:a16="http://schemas.microsoft.com/office/drawing/2014/main" xmlns="" id="{E725A64C-C931-4DB5-AE3F-0161AE436200}"/>
               </a:ext>
             </a:extLst>
           </p:cNvPr>
@@ -6485,7 +6485,7 @@
           <p:cNvPr id="69" name="직선 화살표 연결선 68">
             <a:extLst>
               <a:ext uri="{FF2B5EF4-FFF2-40B4-BE49-F238E27FC236}">
-                <a16:creationId xmlns:a16="http://schemas.microsoft.com/office/drawing/2014/main" id="{87EA7032-CEE1-4C41-823C-BFE4B3D7AA3F}"/>
+                <a16:creationId xmlns:a16="http://schemas.microsoft.com/office/drawing/2014/main" xmlns="" id="{87EA7032-CEE1-4C41-823C-BFE4B3D7AA3F}"/>
               </a:ext>
             </a:extLst>
           </p:cNvPr>
@@ -6527,7 +6527,7 @@
           <p:cNvPr id="71" name="직선 화살표 연결선 70">
             <a:extLst>
               <a:ext uri="{FF2B5EF4-FFF2-40B4-BE49-F238E27FC236}">
-                <a16:creationId xmlns:a16="http://schemas.microsoft.com/office/drawing/2014/main" id="{B66CA6AF-FFD7-4835-9998-FC29C622A336}"/>
+                <a16:creationId xmlns:a16="http://schemas.microsoft.com/office/drawing/2014/main" xmlns="" id="{B66CA6AF-FFD7-4835-9998-FC29C622A336}"/>
               </a:ext>
             </a:extLst>
           </p:cNvPr>
@@ -6569,7 +6569,7 @@
           <p:cNvPr id="73" name="직선 화살표 연결선 72">
             <a:extLst>
               <a:ext uri="{FF2B5EF4-FFF2-40B4-BE49-F238E27FC236}">
-                <a16:creationId xmlns:a16="http://schemas.microsoft.com/office/drawing/2014/main" id="{E9006923-7BB8-4F9C-B668-2E7A5D368EB7}"/>
+                <a16:creationId xmlns:a16="http://schemas.microsoft.com/office/drawing/2014/main" xmlns="" id="{E9006923-7BB8-4F9C-B668-2E7A5D368EB7}"/>
               </a:ext>
             </a:extLst>
           </p:cNvPr>
@@ -6611,7 +6611,7 @@
           <p:cNvPr id="75" name="연결선: 꺾임 74">
             <a:extLst>
               <a:ext uri="{FF2B5EF4-FFF2-40B4-BE49-F238E27FC236}">
-                <a16:creationId xmlns:a16="http://schemas.microsoft.com/office/drawing/2014/main" id="{1B06AD8B-04D7-405D-877C-55A49B42A4A4}"/>
+                <a16:creationId xmlns:a16="http://schemas.microsoft.com/office/drawing/2014/main" xmlns="" id="{1B06AD8B-04D7-405D-877C-55A49B42A4A4}"/>
               </a:ext>
             </a:extLst>
           </p:cNvPr>
@@ -6656,7 +6656,7 @@
           <p:cNvPr id="78" name="연결선: 꺾임 77">
             <a:extLst>
               <a:ext uri="{FF2B5EF4-FFF2-40B4-BE49-F238E27FC236}">
-                <a16:creationId xmlns:a16="http://schemas.microsoft.com/office/drawing/2014/main" id="{4B817C6E-EBA2-4FF1-AF88-FD5ACD6904CB}"/>
+                <a16:creationId xmlns:a16="http://schemas.microsoft.com/office/drawing/2014/main" xmlns="" id="{4B817C6E-EBA2-4FF1-AF88-FD5ACD6904CB}"/>
               </a:ext>
             </a:extLst>
           </p:cNvPr>
@@ -6676,6 +6676,603 @@
               <a:gd name="adj1" fmla="val -2829"/>
               <a:gd name="adj2" fmla="val 165917"/>
             </a:avLst>
+          </a:prstGeom>
+          <a:ln>
+            <a:tailEnd type="triangle"/>
+          </a:ln>
+        </p:spPr>
+        <p:style>
+          <a:lnRef idx="1">
+            <a:schemeClr val="accent1"/>
+          </a:lnRef>
+          <a:fillRef idx="0">
+            <a:schemeClr val="accent1"/>
+          </a:fillRef>
+          <a:effectRef idx="0">
+            <a:schemeClr val="accent1"/>
+          </a:effectRef>
+          <a:fontRef idx="minor">
+            <a:schemeClr val="tx1"/>
+          </a:fontRef>
+        </p:style>
+      </p:cxnSp>
+      <p:sp>
+        <p:nvSpPr>
+          <p:cNvPr id="38" name="순서도: 판단 37">
+            <a:extLst>
+              <a:ext uri="{FF2B5EF4-FFF2-40B4-BE49-F238E27FC236}">
+                <a16:creationId xmlns:a16="http://schemas.microsoft.com/office/drawing/2014/main" xmlns="" id="{B6B05B20-E958-4D01-9C1E-F39E75757B4D}"/>
+              </a:ext>
+            </a:extLst>
+          </p:cNvPr>
+          <p:cNvSpPr/>
+          <p:nvPr/>
+        </p:nvSpPr>
+        <p:spPr>
+          <a:xfrm>
+            <a:off x="6211553" y="4775433"/>
+            <a:ext cx="2225222" cy="849023"/>
+          </a:xfrm>
+          <a:prstGeom prst="flowChartDecision">
+            <a:avLst/>
+          </a:prstGeom>
+        </p:spPr>
+        <p:style>
+          <a:lnRef idx="2">
+            <a:schemeClr val="accent1">
+              <a:shade val="50000"/>
+            </a:schemeClr>
+          </a:lnRef>
+          <a:fillRef idx="1">
+            <a:schemeClr val="accent1"/>
+          </a:fillRef>
+          <a:effectRef idx="0">
+            <a:schemeClr val="accent1"/>
+          </a:effectRef>
+          <a:fontRef idx="minor">
+            <a:schemeClr val="lt1"/>
+          </a:fontRef>
+        </p:style>
+        <p:txBody>
+          <a:bodyPr rtlCol="0" anchor="ctr"/>
+          <a:lstStyle/>
+          <a:p>
+            <a:pPr algn="ctr"/>
+            <a:endParaRPr lang="en-US" altLang="ko-KR" sz="1100" dirty="0" smtClean="0"/>
+          </a:p>
+          <a:p>
+            <a:pPr algn="ctr"/>
+            <a:r>
+              <a:rPr lang="en-US" altLang="ko-KR" sz="1100" dirty="0" err="1" smtClean="0"/>
+              <a:t>RightOn</a:t>
+            </a:r>
+            <a:r>
+              <a:rPr lang="en-US" altLang="ko-KR" sz="1100" dirty="0" smtClean="0"/>
+              <a:t> ==1</a:t>
+            </a:r>
+          </a:p>
+          <a:p>
+            <a:pPr algn="ctr"/>
+            <a:r>
+              <a:rPr lang="en-US" altLang="ko-KR" sz="1100" dirty="0" smtClean="0"/>
+              <a:t>And</a:t>
+            </a:r>
+          </a:p>
+          <a:p>
+            <a:pPr algn="ctr"/>
+            <a:r>
+              <a:rPr lang="en-US" altLang="ko-KR" sz="1100" dirty="0" smtClean="0"/>
+              <a:t>Move ==1</a:t>
+            </a:r>
+          </a:p>
+          <a:p>
+            <a:pPr algn="ctr"/>
+            <a:endParaRPr lang="ko-KR" altLang="en-US" sz="1100" dirty="0"/>
+          </a:p>
+        </p:txBody>
+      </p:sp>
+      <p:cxnSp>
+        <p:nvCxnSpPr>
+          <p:cNvPr id="41" name="직선 화살표 연결선 40">
+            <a:extLst>
+              <a:ext uri="{FF2B5EF4-FFF2-40B4-BE49-F238E27FC236}">
+                <a16:creationId xmlns:a16="http://schemas.microsoft.com/office/drawing/2014/main" xmlns="" id="{E9006923-7BB8-4F9C-B668-2E7A5D368EB7}"/>
+              </a:ext>
+            </a:extLst>
+          </p:cNvPr>
+          <p:cNvCxnSpPr/>
+          <p:nvPr/>
+        </p:nvCxnSpPr>
+        <p:spPr>
+          <a:xfrm flipH="1">
+            <a:off x="7324164" y="4204307"/>
+            <a:ext cx="1" cy="550940"/>
+          </a:xfrm>
+          <a:prstGeom prst="straightConnector1">
+            <a:avLst/>
+          </a:prstGeom>
+          <a:ln>
+            <a:tailEnd type="triangle"/>
+          </a:ln>
+        </p:spPr>
+        <p:style>
+          <a:lnRef idx="1">
+            <a:schemeClr val="accent1"/>
+          </a:lnRef>
+          <a:fillRef idx="0">
+            <a:schemeClr val="accent1"/>
+          </a:fillRef>
+          <a:effectRef idx="0">
+            <a:schemeClr val="accent1"/>
+          </a:effectRef>
+          <a:fontRef idx="minor">
+            <a:schemeClr val="tx1"/>
+          </a:fontRef>
+        </p:style>
+      </p:cxnSp>
+      <p:sp>
+        <p:nvSpPr>
+          <p:cNvPr id="42" name="순서도: 처리 41">
+            <a:extLst>
+              <a:ext uri="{FF2B5EF4-FFF2-40B4-BE49-F238E27FC236}">
+                <a16:creationId xmlns:a16="http://schemas.microsoft.com/office/drawing/2014/main" xmlns="" id="{F299989F-B0E4-4A99-916F-8B1C535D05E0}"/>
+              </a:ext>
+            </a:extLst>
+          </p:cNvPr>
+          <p:cNvSpPr/>
+          <p:nvPr/>
+        </p:nvSpPr>
+        <p:spPr>
+          <a:xfrm>
+            <a:off x="6781195" y="5940034"/>
+            <a:ext cx="1085938" cy="494447"/>
+          </a:xfrm>
+          <a:prstGeom prst="flowChartProcess">
+            <a:avLst/>
+          </a:prstGeom>
+        </p:spPr>
+        <p:style>
+          <a:lnRef idx="2">
+            <a:schemeClr val="accent1">
+              <a:shade val="50000"/>
+            </a:schemeClr>
+          </a:lnRef>
+          <a:fillRef idx="1">
+            <a:schemeClr val="accent1"/>
+          </a:fillRef>
+          <a:effectRef idx="0">
+            <a:schemeClr val="accent1"/>
+          </a:effectRef>
+          <a:fontRef idx="minor">
+            <a:schemeClr val="lt1"/>
+          </a:fontRef>
+        </p:style>
+        <p:txBody>
+          <a:bodyPr rtlCol="0" anchor="ctr"/>
+          <a:lstStyle/>
+          <a:p>
+            <a:pPr algn="ctr"/>
+            <a:r>
+              <a:rPr lang="en-US" altLang="ko-KR" sz="1100" dirty="0" err="1" smtClean="0"/>
+              <a:t>AnimationRightCall</a:t>
+            </a:r>
+            <a:endParaRPr lang="ko-KR" altLang="en-US" sz="1100" dirty="0"/>
+          </a:p>
+        </p:txBody>
+      </p:sp>
+      <p:cxnSp>
+        <p:nvCxnSpPr>
+          <p:cNvPr id="43" name="직선 화살표 연결선 42">
+            <a:extLst>
+              <a:ext uri="{FF2B5EF4-FFF2-40B4-BE49-F238E27FC236}">
+                <a16:creationId xmlns:a16="http://schemas.microsoft.com/office/drawing/2014/main" xmlns="" id="{509C78DC-1C9F-4CD1-A05E-2B6FF1514966}"/>
+              </a:ext>
+            </a:extLst>
+          </p:cNvPr>
+          <p:cNvCxnSpPr>
+            <a:cxnSpLocks/>
+            <a:endCxn id="42" idx="0"/>
+          </p:cNvCxnSpPr>
+          <p:nvPr/>
+        </p:nvCxnSpPr>
+        <p:spPr>
+          <a:xfrm>
+            <a:off x="7324164" y="5605658"/>
+            <a:ext cx="0" cy="334376"/>
+          </a:xfrm>
+          <a:prstGeom prst="straightConnector1">
+            <a:avLst/>
+          </a:prstGeom>
+          <a:ln>
+            <a:tailEnd type="triangle"/>
+          </a:ln>
+        </p:spPr>
+        <p:style>
+          <a:lnRef idx="1">
+            <a:schemeClr val="accent1"/>
+          </a:lnRef>
+          <a:fillRef idx="0">
+            <a:schemeClr val="accent1"/>
+          </a:fillRef>
+          <a:effectRef idx="0">
+            <a:schemeClr val="accent1"/>
+          </a:effectRef>
+          <a:fontRef idx="minor">
+            <a:schemeClr val="tx1"/>
+          </a:fontRef>
+        </p:style>
+      </p:cxnSp>
+      <p:sp>
+        <p:nvSpPr>
+          <p:cNvPr id="45" name="순서도: 판단 44">
+            <a:extLst>
+              <a:ext uri="{FF2B5EF4-FFF2-40B4-BE49-F238E27FC236}">
+                <a16:creationId xmlns:a16="http://schemas.microsoft.com/office/drawing/2014/main" xmlns="" id="{B6B05B20-E958-4D01-9C1E-F39E75757B4D}"/>
+              </a:ext>
+            </a:extLst>
+          </p:cNvPr>
+          <p:cNvSpPr/>
+          <p:nvPr/>
+        </p:nvSpPr>
+        <p:spPr>
+          <a:xfrm>
+            <a:off x="3792920" y="4775433"/>
+            <a:ext cx="2225222" cy="849023"/>
+          </a:xfrm>
+          <a:prstGeom prst="flowChartDecision">
+            <a:avLst/>
+          </a:prstGeom>
+        </p:spPr>
+        <p:style>
+          <a:lnRef idx="2">
+            <a:schemeClr val="accent1">
+              <a:shade val="50000"/>
+            </a:schemeClr>
+          </a:lnRef>
+          <a:fillRef idx="1">
+            <a:schemeClr val="accent1"/>
+          </a:fillRef>
+          <a:effectRef idx="0">
+            <a:schemeClr val="accent1"/>
+          </a:effectRef>
+          <a:fontRef idx="minor">
+            <a:schemeClr val="lt1"/>
+          </a:fontRef>
+        </p:style>
+        <p:txBody>
+          <a:bodyPr rtlCol="0" anchor="ctr"/>
+          <a:lstStyle/>
+          <a:p>
+            <a:pPr algn="ctr"/>
+            <a:endParaRPr lang="en-US" altLang="ko-KR" sz="1100" dirty="0"/>
+          </a:p>
+          <a:p>
+            <a:pPr algn="ctr"/>
+            <a:r>
+              <a:rPr lang="en-US" altLang="ko-KR" sz="1100" dirty="0" err="1" smtClean="0"/>
+              <a:t>LeftOn</a:t>
+            </a:r>
+            <a:r>
+              <a:rPr lang="en-US" altLang="ko-KR" sz="1100" dirty="0" smtClean="0"/>
+              <a:t> ==1</a:t>
+            </a:r>
+          </a:p>
+          <a:p>
+            <a:pPr algn="ctr"/>
+            <a:r>
+              <a:rPr lang="en-US" altLang="ko-KR" sz="1100" dirty="0" smtClean="0"/>
+              <a:t>And</a:t>
+            </a:r>
+          </a:p>
+          <a:p>
+            <a:pPr algn="ctr"/>
+            <a:r>
+              <a:rPr lang="en-US" altLang="ko-KR" sz="1100" dirty="0" smtClean="0"/>
+              <a:t>Move ==1</a:t>
+            </a:r>
+          </a:p>
+          <a:p>
+            <a:pPr algn="ctr"/>
+            <a:endParaRPr lang="ko-KR" altLang="en-US" sz="1100" dirty="0"/>
+          </a:p>
+        </p:txBody>
+      </p:sp>
+      <p:sp>
+        <p:nvSpPr>
+          <p:cNvPr id="47" name="순서도: 처리 46">
+            <a:extLst>
+              <a:ext uri="{FF2B5EF4-FFF2-40B4-BE49-F238E27FC236}">
+                <a16:creationId xmlns:a16="http://schemas.microsoft.com/office/drawing/2014/main" xmlns="" id="{F299989F-B0E4-4A99-916F-8B1C535D05E0}"/>
+              </a:ext>
+            </a:extLst>
+          </p:cNvPr>
+          <p:cNvSpPr/>
+          <p:nvPr/>
+        </p:nvSpPr>
+        <p:spPr>
+          <a:xfrm>
+            <a:off x="4362562" y="5940034"/>
+            <a:ext cx="1085938" cy="494447"/>
+          </a:xfrm>
+          <a:prstGeom prst="flowChartProcess">
+            <a:avLst/>
+          </a:prstGeom>
+        </p:spPr>
+        <p:style>
+          <a:lnRef idx="2">
+            <a:schemeClr val="accent1">
+              <a:shade val="50000"/>
+            </a:schemeClr>
+          </a:lnRef>
+          <a:fillRef idx="1">
+            <a:schemeClr val="accent1"/>
+          </a:fillRef>
+          <a:effectRef idx="0">
+            <a:schemeClr val="accent1"/>
+          </a:effectRef>
+          <a:fontRef idx="minor">
+            <a:schemeClr val="lt1"/>
+          </a:fontRef>
+        </p:style>
+        <p:txBody>
+          <a:bodyPr rtlCol="0" anchor="ctr"/>
+          <a:lstStyle/>
+          <a:p>
+            <a:pPr algn="ctr"/>
+            <a:r>
+              <a:rPr lang="en-US" altLang="ko-KR" sz="1100" dirty="0" err="1" smtClean="0"/>
+              <a:t>AnimationLeftCall</a:t>
+            </a:r>
+            <a:endParaRPr lang="ko-KR" altLang="en-US" sz="1100" dirty="0"/>
+          </a:p>
+        </p:txBody>
+      </p:sp>
+      <p:cxnSp>
+        <p:nvCxnSpPr>
+          <p:cNvPr id="49" name="직선 화살표 연결선 48">
+            <a:extLst>
+              <a:ext uri="{FF2B5EF4-FFF2-40B4-BE49-F238E27FC236}">
+                <a16:creationId xmlns:a16="http://schemas.microsoft.com/office/drawing/2014/main" xmlns="" id="{509C78DC-1C9F-4CD1-A05E-2B6FF1514966}"/>
+              </a:ext>
+            </a:extLst>
+          </p:cNvPr>
+          <p:cNvCxnSpPr>
+            <a:cxnSpLocks/>
+            <a:endCxn id="47" idx="0"/>
+          </p:cNvCxnSpPr>
+          <p:nvPr/>
+        </p:nvCxnSpPr>
+        <p:spPr>
+          <a:xfrm>
+            <a:off x="4905531" y="5605658"/>
+            <a:ext cx="0" cy="334376"/>
+          </a:xfrm>
+          <a:prstGeom prst="straightConnector1">
+            <a:avLst/>
+          </a:prstGeom>
+          <a:ln>
+            <a:tailEnd type="triangle"/>
+          </a:ln>
+        </p:spPr>
+        <p:style>
+          <a:lnRef idx="1">
+            <a:schemeClr val="accent1"/>
+          </a:lnRef>
+          <a:fillRef idx="0">
+            <a:schemeClr val="accent1"/>
+          </a:fillRef>
+          <a:effectRef idx="0">
+            <a:schemeClr val="accent1"/>
+          </a:effectRef>
+          <a:fontRef idx="minor">
+            <a:schemeClr val="tx1"/>
+          </a:fontRef>
+        </p:style>
+      </p:cxnSp>
+      <p:sp>
+        <p:nvSpPr>
+          <p:cNvPr id="51" name="순서도: 판단 50">
+            <a:extLst>
+              <a:ext uri="{FF2B5EF4-FFF2-40B4-BE49-F238E27FC236}">
+                <a16:creationId xmlns:a16="http://schemas.microsoft.com/office/drawing/2014/main" xmlns="" id="{B6B05B20-E958-4D01-9C1E-F39E75757B4D}"/>
+              </a:ext>
+            </a:extLst>
+          </p:cNvPr>
+          <p:cNvSpPr/>
+          <p:nvPr/>
+        </p:nvSpPr>
+        <p:spPr>
+          <a:xfrm>
+            <a:off x="8646633" y="4775433"/>
+            <a:ext cx="2225222" cy="849023"/>
+          </a:xfrm>
+          <a:prstGeom prst="flowChartDecision">
+            <a:avLst/>
+          </a:prstGeom>
+        </p:spPr>
+        <p:style>
+          <a:lnRef idx="2">
+            <a:schemeClr val="accent1">
+              <a:shade val="50000"/>
+            </a:schemeClr>
+          </a:lnRef>
+          <a:fillRef idx="1">
+            <a:schemeClr val="accent1"/>
+          </a:fillRef>
+          <a:effectRef idx="0">
+            <a:schemeClr val="accent1"/>
+          </a:effectRef>
+          <a:fontRef idx="minor">
+            <a:schemeClr val="lt1"/>
+          </a:fontRef>
+        </p:style>
+        <p:txBody>
+          <a:bodyPr rtlCol="0" anchor="ctr"/>
+          <a:lstStyle/>
+          <a:p>
+            <a:pPr algn="ctr"/>
+            <a:endParaRPr lang="en-US" altLang="ko-KR" sz="1100" dirty="0" smtClean="0"/>
+          </a:p>
+          <a:p>
+            <a:pPr algn="ctr"/>
+            <a:r>
+              <a:rPr lang="en-US" altLang="ko-KR" sz="1100" dirty="0" err="1" smtClean="0"/>
+              <a:t>Overlaycount</a:t>
+            </a:r>
+            <a:r>
+              <a:rPr lang="en-US" altLang="ko-KR" sz="1100" dirty="0" smtClean="0"/>
+              <a:t> == 20</a:t>
+            </a:r>
+            <a:endParaRPr lang="en-US" altLang="ko-KR" sz="1100" dirty="0" smtClean="0"/>
+          </a:p>
+          <a:p>
+            <a:pPr algn="ctr"/>
+            <a:endParaRPr lang="ko-KR" altLang="en-US" sz="1100" dirty="0"/>
+          </a:p>
+        </p:txBody>
+      </p:sp>
+      <p:sp>
+        <p:nvSpPr>
+          <p:cNvPr id="52" name="순서도: 처리 51">
+            <a:extLst>
+              <a:ext uri="{FF2B5EF4-FFF2-40B4-BE49-F238E27FC236}">
+                <a16:creationId xmlns:a16="http://schemas.microsoft.com/office/drawing/2014/main" xmlns="" id="{F299989F-B0E4-4A99-916F-8B1C535D05E0}"/>
+              </a:ext>
+            </a:extLst>
+          </p:cNvPr>
+          <p:cNvSpPr/>
+          <p:nvPr/>
+        </p:nvSpPr>
+        <p:spPr>
+          <a:xfrm>
+            <a:off x="9216275" y="5940034"/>
+            <a:ext cx="1085938" cy="494447"/>
+          </a:xfrm>
+          <a:prstGeom prst="flowChartProcess">
+            <a:avLst/>
+          </a:prstGeom>
+        </p:spPr>
+        <p:style>
+          <a:lnRef idx="2">
+            <a:schemeClr val="accent1">
+              <a:shade val="50000"/>
+            </a:schemeClr>
+          </a:lnRef>
+          <a:fillRef idx="1">
+            <a:schemeClr val="accent1"/>
+          </a:fillRef>
+          <a:effectRef idx="0">
+            <a:schemeClr val="accent1"/>
+          </a:effectRef>
+          <a:fontRef idx="minor">
+            <a:schemeClr val="lt1"/>
+          </a:fontRef>
+        </p:style>
+        <p:txBody>
+          <a:bodyPr rtlCol="0" anchor="ctr"/>
+          <a:lstStyle/>
+          <a:p>
+            <a:pPr algn="ctr"/>
+            <a:r>
+              <a:rPr lang="en-US" altLang="ko-KR" sz="1100" dirty="0" smtClean="0"/>
+              <a:t>overlay</a:t>
+            </a:r>
+            <a:endParaRPr lang="ko-KR" altLang="en-US" sz="1100" dirty="0"/>
+          </a:p>
+        </p:txBody>
+      </p:sp>
+      <p:cxnSp>
+        <p:nvCxnSpPr>
+          <p:cNvPr id="54" name="직선 화살표 연결선 53">
+            <a:extLst>
+              <a:ext uri="{FF2B5EF4-FFF2-40B4-BE49-F238E27FC236}">
+                <a16:creationId xmlns:a16="http://schemas.microsoft.com/office/drawing/2014/main" xmlns="" id="{509C78DC-1C9F-4CD1-A05E-2B6FF1514966}"/>
+              </a:ext>
+            </a:extLst>
+          </p:cNvPr>
+          <p:cNvCxnSpPr>
+            <a:cxnSpLocks/>
+            <a:endCxn id="52" idx="0"/>
+          </p:cNvCxnSpPr>
+          <p:nvPr/>
+        </p:nvCxnSpPr>
+        <p:spPr>
+          <a:xfrm>
+            <a:off x="9759244" y="5605658"/>
+            <a:ext cx="0" cy="334376"/>
+          </a:xfrm>
+          <a:prstGeom prst="straightConnector1">
+            <a:avLst/>
+          </a:prstGeom>
+          <a:ln>
+            <a:tailEnd type="triangle"/>
+          </a:ln>
+        </p:spPr>
+        <p:style>
+          <a:lnRef idx="1">
+            <a:schemeClr val="accent1"/>
+          </a:lnRef>
+          <a:fillRef idx="0">
+            <a:schemeClr val="accent1"/>
+          </a:fillRef>
+          <a:effectRef idx="0">
+            <a:schemeClr val="accent1"/>
+          </a:effectRef>
+          <a:fontRef idx="minor">
+            <a:schemeClr val="tx1"/>
+          </a:fontRef>
+        </p:style>
+      </p:cxnSp>
+      <p:cxnSp>
+        <p:nvCxnSpPr>
+          <p:cNvPr id="10" name="직선 화살표 연결선 9"/>
+          <p:cNvCxnSpPr>
+            <a:stCxn id="37" idx="2"/>
+          </p:cNvCxnSpPr>
+          <p:nvPr/>
+        </p:nvCxnSpPr>
+        <p:spPr>
+          <a:xfrm flipH="1">
+            <a:off x="4905531" y="4212631"/>
+            <a:ext cx="2418633" cy="542616"/>
+          </a:xfrm>
+          <a:prstGeom prst="straightConnector1">
+            <a:avLst/>
+          </a:prstGeom>
+          <a:ln>
+            <a:tailEnd type="triangle"/>
+          </a:ln>
+        </p:spPr>
+        <p:style>
+          <a:lnRef idx="1">
+            <a:schemeClr val="accent1"/>
+          </a:lnRef>
+          <a:fillRef idx="0">
+            <a:schemeClr val="accent1"/>
+          </a:fillRef>
+          <a:effectRef idx="0">
+            <a:schemeClr val="accent1"/>
+          </a:effectRef>
+          <a:fontRef idx="minor">
+            <a:schemeClr val="tx1"/>
+          </a:fontRef>
+        </p:style>
+      </p:cxnSp>
+      <p:cxnSp>
+        <p:nvCxnSpPr>
+          <p:cNvPr id="14" name="직선 화살표 연결선 13"/>
+          <p:cNvCxnSpPr>
+            <a:stCxn id="37" idx="2"/>
+          </p:cNvCxnSpPr>
+          <p:nvPr/>
+        </p:nvCxnSpPr>
+        <p:spPr>
+          <a:xfrm>
+            <a:off x="7324164" y="4212631"/>
+            <a:ext cx="2338820" cy="542616"/>
+          </a:xfrm>
+          <a:prstGeom prst="straightConnector1">
+            <a:avLst/>
           </a:prstGeom>
           <a:ln>
             <a:tailEnd type="triangle"/>
@@ -6731,7 +7328,7 @@
           <p:cNvPr id="2" name="제목 1">
             <a:extLst>
               <a:ext uri="{FF2B5EF4-FFF2-40B4-BE49-F238E27FC236}">
-                <a16:creationId xmlns:a16="http://schemas.microsoft.com/office/drawing/2014/main" id="{960D5968-87FD-4F53-B0A4-8A6B068BF2F0}"/>
+                <a16:creationId xmlns:a16="http://schemas.microsoft.com/office/drawing/2014/main" xmlns="" id="{960D5968-87FD-4F53-B0A4-8A6B068BF2F0}"/>
               </a:ext>
             </a:extLst>
           </p:cNvPr>
@@ -6764,7 +7361,7 @@
           <p:cNvPr id="4" name="내용 개체 틀 3">
             <a:extLst>
               <a:ext uri="{FF2B5EF4-FFF2-40B4-BE49-F238E27FC236}">
-                <a16:creationId xmlns:a16="http://schemas.microsoft.com/office/drawing/2014/main" id="{B6464F43-8EC3-466E-A6F6-AC030B8ABEF8}"/>
+                <a16:creationId xmlns:a16="http://schemas.microsoft.com/office/drawing/2014/main" xmlns="" id="{B6464F43-8EC3-466E-A6F6-AC030B8ABEF8}"/>
               </a:ext>
             </a:extLst>
           </p:cNvPr>
@@ -6796,7 +7393,7 @@
           <p:cNvPr id="6" name="표 5">
             <a:extLst>
               <a:ext uri="{FF2B5EF4-FFF2-40B4-BE49-F238E27FC236}">
-                <a16:creationId xmlns:a16="http://schemas.microsoft.com/office/drawing/2014/main" id="{C7030643-B004-41E5-8B8D-9A70B3312B81}"/>
+                <a16:creationId xmlns:a16="http://schemas.microsoft.com/office/drawing/2014/main" xmlns="" id="{C7030643-B004-41E5-8B8D-9A70B3312B81}"/>
               </a:ext>
             </a:extLst>
           </p:cNvPr>
@@ -6825,7 +7422,7 @@
                 <a:gridCol w="1618678">
                   <a:extLst>
                     <a:ext uri="{9D8B030D-6E8A-4147-A177-3AD203B41FA5}">
-                      <a16:colId xmlns:a16="http://schemas.microsoft.com/office/drawing/2014/main" val="2750948999"/>
+                      <a16:colId xmlns:a16="http://schemas.microsoft.com/office/drawing/2014/main" xmlns="" val="2750948999"/>
                     </a:ext>
                   </a:extLst>
                 </a:gridCol>
@@ -6848,7 +7445,7 @@
                 </a:tc>
                 <a:extLst>
                   <a:ext uri="{0D108BD9-81ED-4DB2-BD59-A6C34878D82A}">
-                    <a16:rowId xmlns:a16="http://schemas.microsoft.com/office/drawing/2014/main" val="3884695047"/>
+                    <a16:rowId xmlns:a16="http://schemas.microsoft.com/office/drawing/2014/main" xmlns="" val="3884695047"/>
                   </a:ext>
                 </a:extLst>
               </a:tr>
@@ -6870,7 +7467,7 @@
                 </a:tc>
                 <a:extLst>
                   <a:ext uri="{0D108BD9-81ED-4DB2-BD59-A6C34878D82A}">
-                    <a16:rowId xmlns:a16="http://schemas.microsoft.com/office/drawing/2014/main" val="3546185854"/>
+                    <a16:rowId xmlns:a16="http://schemas.microsoft.com/office/drawing/2014/main" xmlns="" val="3546185854"/>
                   </a:ext>
                 </a:extLst>
               </a:tr>
@@ -6892,7 +7489,7 @@
                 </a:tc>
                 <a:extLst>
                   <a:ext uri="{0D108BD9-81ED-4DB2-BD59-A6C34878D82A}">
-                    <a16:rowId xmlns:a16="http://schemas.microsoft.com/office/drawing/2014/main" val="3600756719"/>
+                    <a16:rowId xmlns:a16="http://schemas.microsoft.com/office/drawing/2014/main" xmlns="" val="3600756719"/>
                   </a:ext>
                 </a:extLst>
               </a:tr>
@@ -6914,7 +7511,7 @@
                 </a:tc>
                 <a:extLst>
                   <a:ext uri="{0D108BD9-81ED-4DB2-BD59-A6C34878D82A}">
-                    <a16:rowId xmlns:a16="http://schemas.microsoft.com/office/drawing/2014/main" val="2952049210"/>
+                    <a16:rowId xmlns:a16="http://schemas.microsoft.com/office/drawing/2014/main" xmlns="" val="2952049210"/>
                   </a:ext>
                 </a:extLst>
               </a:tr>
@@ -6936,7 +7533,7 @@
                 </a:tc>
                 <a:extLst>
                   <a:ext uri="{0D108BD9-81ED-4DB2-BD59-A6C34878D82A}">
-                    <a16:rowId xmlns:a16="http://schemas.microsoft.com/office/drawing/2014/main" val="3051025707"/>
+                    <a16:rowId xmlns:a16="http://schemas.microsoft.com/office/drawing/2014/main" xmlns="" val="3051025707"/>
                   </a:ext>
                 </a:extLst>
               </a:tr>
@@ -6958,7 +7555,7 @@
                 </a:tc>
                 <a:extLst>
                   <a:ext uri="{0D108BD9-81ED-4DB2-BD59-A6C34878D82A}">
-                    <a16:rowId xmlns:a16="http://schemas.microsoft.com/office/drawing/2014/main" val="1596961051"/>
+                    <a16:rowId xmlns:a16="http://schemas.microsoft.com/office/drawing/2014/main" xmlns="" val="1596961051"/>
                   </a:ext>
                 </a:extLst>
               </a:tr>
@@ -6980,7 +7577,7 @@
                 </a:tc>
                 <a:extLst>
                   <a:ext uri="{0D108BD9-81ED-4DB2-BD59-A6C34878D82A}">
-                    <a16:rowId xmlns:a16="http://schemas.microsoft.com/office/drawing/2014/main" val="2758856301"/>
+                    <a16:rowId xmlns:a16="http://schemas.microsoft.com/office/drawing/2014/main" xmlns="" val="2758856301"/>
                   </a:ext>
                 </a:extLst>
               </a:tr>
@@ -6993,7 +7590,7 @@
           <p:cNvPr id="8" name="TextBox 7">
             <a:extLst>
               <a:ext uri="{FF2B5EF4-FFF2-40B4-BE49-F238E27FC236}">
-                <a16:creationId xmlns:a16="http://schemas.microsoft.com/office/drawing/2014/main" id="{EE8D7CF4-3C56-4BE3-91E7-9505C5FEE772}"/>
+                <a16:creationId xmlns:a16="http://schemas.microsoft.com/office/drawing/2014/main" xmlns="" id="{EE8D7CF4-3C56-4BE3-91E7-9505C5FEE772}"/>
               </a:ext>
             </a:extLst>
           </p:cNvPr>
@@ -7176,7 +7773,7 @@
           <p:cNvPr id="3" name="타원 2">
             <a:extLst>
               <a:ext uri="{FF2B5EF4-FFF2-40B4-BE49-F238E27FC236}">
-                <a16:creationId xmlns:a16="http://schemas.microsoft.com/office/drawing/2014/main" id="{FAC84D3E-C281-4020-9AA7-C03071690BA3}"/>
+                <a16:creationId xmlns:a16="http://schemas.microsoft.com/office/drawing/2014/main" xmlns="" id="{FAC84D3E-C281-4020-9AA7-C03071690BA3}"/>
               </a:ext>
             </a:extLst>
           </p:cNvPr>
@@ -7222,7 +7819,7 @@
           <p:cNvPr id="7" name="타원 6">
             <a:extLst>
               <a:ext uri="{FF2B5EF4-FFF2-40B4-BE49-F238E27FC236}">
-                <a16:creationId xmlns:a16="http://schemas.microsoft.com/office/drawing/2014/main" id="{E90DCBBE-FBF7-4C08-B7AF-22F699A3B5B6}"/>
+                <a16:creationId xmlns:a16="http://schemas.microsoft.com/office/drawing/2014/main" xmlns="" id="{E90DCBBE-FBF7-4C08-B7AF-22F699A3B5B6}"/>
               </a:ext>
             </a:extLst>
           </p:cNvPr>
@@ -7298,7 +7895,7 @@
           <p:cNvPr id="2" name="제목 1">
             <a:extLst>
               <a:ext uri="{FF2B5EF4-FFF2-40B4-BE49-F238E27FC236}">
-                <a16:creationId xmlns:a16="http://schemas.microsoft.com/office/drawing/2014/main" id="{B0497BC4-A30D-4F53-AAD3-9B51EBF97CAB}"/>
+                <a16:creationId xmlns:a16="http://schemas.microsoft.com/office/drawing/2014/main" xmlns="" id="{B0497BC4-A30D-4F53-AAD3-9B51EBF97CAB}"/>
               </a:ext>
             </a:extLst>
           </p:cNvPr>
@@ -7331,7 +7928,7 @@
           <p:cNvPr id="4" name="내용 개체 틀 3">
             <a:extLst>
               <a:ext uri="{FF2B5EF4-FFF2-40B4-BE49-F238E27FC236}">
-                <a16:creationId xmlns:a16="http://schemas.microsoft.com/office/drawing/2014/main" id="{1FE717B5-C397-4D21-BBF9-00CDBF9C50B6}"/>
+                <a16:creationId xmlns:a16="http://schemas.microsoft.com/office/drawing/2014/main" xmlns="" id="{1FE717B5-C397-4D21-BBF9-00CDBF9C50B6}"/>
               </a:ext>
             </a:extLst>
           </p:cNvPr>
@@ -7363,7 +7960,7 @@
           <p:cNvPr id="5" name="직사각형 4">
             <a:extLst>
               <a:ext uri="{FF2B5EF4-FFF2-40B4-BE49-F238E27FC236}">
-                <a16:creationId xmlns:a16="http://schemas.microsoft.com/office/drawing/2014/main" id="{2A399D5F-01B0-4F20-BEA7-D16EBAB26132}"/>
+                <a16:creationId xmlns:a16="http://schemas.microsoft.com/office/drawing/2014/main" xmlns="" id="{2A399D5F-01B0-4F20-BEA7-D16EBAB26132}"/>
               </a:ext>
             </a:extLst>
           </p:cNvPr>
@@ -7417,7 +8014,7 @@
           <p:cNvPr id="6" name="직사각형 5">
             <a:extLst>
               <a:ext uri="{FF2B5EF4-FFF2-40B4-BE49-F238E27FC236}">
-                <a16:creationId xmlns:a16="http://schemas.microsoft.com/office/drawing/2014/main" id="{4355B051-452D-4CF3-A855-0A9016B26D01}"/>
+                <a16:creationId xmlns:a16="http://schemas.microsoft.com/office/drawing/2014/main" xmlns="" id="{4355B051-452D-4CF3-A855-0A9016B26D01}"/>
               </a:ext>
             </a:extLst>
           </p:cNvPr>
@@ -7466,7 +8063,7 @@
           <p:cNvPr id="7" name="직사각형 6">
             <a:extLst>
               <a:ext uri="{FF2B5EF4-FFF2-40B4-BE49-F238E27FC236}">
-                <a16:creationId xmlns:a16="http://schemas.microsoft.com/office/drawing/2014/main" id="{9A487E40-8904-4F36-ACDC-87A5C8C3C1AA}"/>
+                <a16:creationId xmlns:a16="http://schemas.microsoft.com/office/drawing/2014/main" xmlns="" id="{9A487E40-8904-4F36-ACDC-87A5C8C3C1AA}"/>
               </a:ext>
             </a:extLst>
           </p:cNvPr>
@@ -7515,7 +8112,7 @@
           <p:cNvPr id="8" name="TextBox 7">
             <a:extLst>
               <a:ext uri="{FF2B5EF4-FFF2-40B4-BE49-F238E27FC236}">
-                <a16:creationId xmlns:a16="http://schemas.microsoft.com/office/drawing/2014/main" id="{63E8E266-182F-4435-8EF5-DDB6533D26C4}"/>
+                <a16:creationId xmlns:a16="http://schemas.microsoft.com/office/drawing/2014/main" xmlns="" id="{63E8E266-182F-4435-8EF5-DDB6533D26C4}"/>
               </a:ext>
             </a:extLst>
           </p:cNvPr>
@@ -7584,7 +8181,7 @@
           <p:cNvPr id="10" name="직사각형 9">
             <a:extLst>
               <a:ext uri="{FF2B5EF4-FFF2-40B4-BE49-F238E27FC236}">
-                <a16:creationId xmlns:a16="http://schemas.microsoft.com/office/drawing/2014/main" id="{67167894-2ACE-4D2F-97E4-F2320D033EEE}"/>
+                <a16:creationId xmlns:a16="http://schemas.microsoft.com/office/drawing/2014/main" xmlns="" id="{67167894-2ACE-4D2F-97E4-F2320D033EEE}"/>
               </a:ext>
             </a:extLst>
           </p:cNvPr>
@@ -7633,7 +8230,7 @@
           <p:cNvPr id="11" name="TextBox 10">
             <a:extLst>
               <a:ext uri="{FF2B5EF4-FFF2-40B4-BE49-F238E27FC236}">
-                <a16:creationId xmlns:a16="http://schemas.microsoft.com/office/drawing/2014/main" id="{BD46B30C-E848-423C-AA38-62346A38FD1C}"/>
+                <a16:creationId xmlns:a16="http://schemas.microsoft.com/office/drawing/2014/main" xmlns="" id="{BD46B30C-E848-423C-AA38-62346A38FD1C}"/>
               </a:ext>
             </a:extLst>
           </p:cNvPr>
@@ -7698,7 +8295,7 @@
           <p:cNvPr id="2" name="제목 1">
             <a:extLst>
               <a:ext uri="{FF2B5EF4-FFF2-40B4-BE49-F238E27FC236}">
-                <a16:creationId xmlns:a16="http://schemas.microsoft.com/office/drawing/2014/main" id="{B04E45A7-D351-48AD-880F-200B6627552D}"/>
+                <a16:creationId xmlns:a16="http://schemas.microsoft.com/office/drawing/2014/main" xmlns="" id="{B04E45A7-D351-48AD-880F-200B6627552D}"/>
               </a:ext>
             </a:extLst>
           </p:cNvPr>
@@ -7726,7 +8323,7 @@
           <p:cNvPr id="4" name="내용 개체 틀 3">
             <a:extLst>
               <a:ext uri="{FF2B5EF4-FFF2-40B4-BE49-F238E27FC236}">
-                <a16:creationId xmlns:a16="http://schemas.microsoft.com/office/drawing/2014/main" id="{3912487D-4762-4AD2-9264-BB76B79BD7F4}"/>
+                <a16:creationId xmlns:a16="http://schemas.microsoft.com/office/drawing/2014/main" xmlns="" id="{3912487D-4762-4AD2-9264-BB76B79BD7F4}"/>
               </a:ext>
             </a:extLst>
           </p:cNvPr>
@@ -7758,7 +8355,7 @@
           <p:cNvPr id="5" name="그림 4">
             <a:extLst>
               <a:ext uri="{FF2B5EF4-FFF2-40B4-BE49-F238E27FC236}">
-                <a16:creationId xmlns:a16="http://schemas.microsoft.com/office/drawing/2014/main" id="{23E5B027-2DAC-4E0C-BD5D-393D71219AD9}"/>
+                <a16:creationId xmlns:a16="http://schemas.microsoft.com/office/drawing/2014/main" xmlns="" id="{23E5B027-2DAC-4E0C-BD5D-393D71219AD9}"/>
               </a:ext>
             </a:extLst>
           </p:cNvPr>
@@ -7788,7 +8385,7 @@
           <p:cNvPr id="6" name="직사각형 5">
             <a:extLst>
               <a:ext uri="{FF2B5EF4-FFF2-40B4-BE49-F238E27FC236}">
-                <a16:creationId xmlns:a16="http://schemas.microsoft.com/office/drawing/2014/main" id="{E233E353-9391-46C0-A53C-004D829D9F65}"/>
+                <a16:creationId xmlns:a16="http://schemas.microsoft.com/office/drawing/2014/main" xmlns="" id="{E233E353-9391-46C0-A53C-004D829D9F65}"/>
               </a:ext>
             </a:extLst>
           </p:cNvPr>
@@ -7837,7 +8434,7 @@
           <p:cNvPr id="7" name="직사각형 6">
             <a:extLst>
               <a:ext uri="{FF2B5EF4-FFF2-40B4-BE49-F238E27FC236}">
-                <a16:creationId xmlns:a16="http://schemas.microsoft.com/office/drawing/2014/main" id="{CC0DEA45-42E9-4178-ACF7-8FF3A960C2AC}"/>
+                <a16:creationId xmlns:a16="http://schemas.microsoft.com/office/drawing/2014/main" xmlns="" id="{CC0DEA45-42E9-4178-ACF7-8FF3A960C2AC}"/>
               </a:ext>
             </a:extLst>
           </p:cNvPr>
@@ -7886,7 +8483,7 @@
           <p:cNvPr id="8" name="직사각형 7">
             <a:extLst>
               <a:ext uri="{FF2B5EF4-FFF2-40B4-BE49-F238E27FC236}">
-                <a16:creationId xmlns:a16="http://schemas.microsoft.com/office/drawing/2014/main" id="{0A392887-527F-4A59-AB25-93786BE92509}"/>
+                <a16:creationId xmlns:a16="http://schemas.microsoft.com/office/drawing/2014/main" xmlns="" id="{0A392887-527F-4A59-AB25-93786BE92509}"/>
               </a:ext>
             </a:extLst>
           </p:cNvPr>
@@ -7935,7 +8532,7 @@
           <p:cNvPr id="3" name="TextBox 2">
             <a:extLst>
               <a:ext uri="{FF2B5EF4-FFF2-40B4-BE49-F238E27FC236}">
-                <a16:creationId xmlns:a16="http://schemas.microsoft.com/office/drawing/2014/main" id="{CB9EC69E-7152-4308-B931-320EC17F22E7}"/>
+                <a16:creationId xmlns:a16="http://schemas.microsoft.com/office/drawing/2014/main" xmlns="" id="{CB9EC69E-7152-4308-B931-320EC17F22E7}"/>
               </a:ext>
             </a:extLst>
           </p:cNvPr>
@@ -8045,7 +8642,7 @@
           <p:cNvPr id="2" name="제목 1">
             <a:extLst>
               <a:ext uri="{FF2B5EF4-FFF2-40B4-BE49-F238E27FC236}">
-                <a16:creationId xmlns:a16="http://schemas.microsoft.com/office/drawing/2014/main" id="{EB5F4D01-9872-49D1-81E1-648F5588808B}"/>
+                <a16:creationId xmlns:a16="http://schemas.microsoft.com/office/drawing/2014/main" xmlns="" id="{EB5F4D01-9872-49D1-81E1-648F5588808B}"/>
               </a:ext>
             </a:extLst>
           </p:cNvPr>
@@ -8078,7 +8675,7 @@
           <p:cNvPr id="5" name="내용 개체 틀 3">
             <a:extLst>
               <a:ext uri="{FF2B5EF4-FFF2-40B4-BE49-F238E27FC236}">
-                <a16:creationId xmlns:a16="http://schemas.microsoft.com/office/drawing/2014/main" id="{DD87A239-C3E0-46B6-BDDD-A59B295952BE}"/>
+                <a16:creationId xmlns:a16="http://schemas.microsoft.com/office/drawing/2014/main" xmlns="" id="{DD87A239-C3E0-46B6-BDDD-A59B295952BE}"/>
               </a:ext>
             </a:extLst>
           </p:cNvPr>
@@ -8110,7 +8707,7 @@
           <p:cNvPr id="12" name="직사각형 11">
             <a:extLst>
               <a:ext uri="{FF2B5EF4-FFF2-40B4-BE49-F238E27FC236}">
-                <a16:creationId xmlns:a16="http://schemas.microsoft.com/office/drawing/2014/main" id="{9E739080-653D-4A24-AF53-A669BBA776A5}"/>
+                <a16:creationId xmlns:a16="http://schemas.microsoft.com/office/drawing/2014/main" xmlns="" id="{9E739080-653D-4A24-AF53-A669BBA776A5}"/>
               </a:ext>
             </a:extLst>
           </p:cNvPr>
@@ -8168,7 +8765,7 @@
           <p:cNvPr id="20" name="직사각형 19">
             <a:extLst>
               <a:ext uri="{FF2B5EF4-FFF2-40B4-BE49-F238E27FC236}">
-                <a16:creationId xmlns:a16="http://schemas.microsoft.com/office/drawing/2014/main" id="{501CE7CF-D015-4856-900A-3D70DD072E6F}"/>
+                <a16:creationId xmlns:a16="http://schemas.microsoft.com/office/drawing/2014/main" xmlns="" id="{501CE7CF-D015-4856-900A-3D70DD072E6F}"/>
               </a:ext>
             </a:extLst>
           </p:cNvPr>
@@ -8226,7 +8823,7 @@
           <p:cNvPr id="21" name="직사각형 20">
             <a:extLst>
               <a:ext uri="{FF2B5EF4-FFF2-40B4-BE49-F238E27FC236}">
-                <a16:creationId xmlns:a16="http://schemas.microsoft.com/office/drawing/2014/main" id="{BAF13379-D48A-4989-B5A9-701D4311E2C7}"/>
+                <a16:creationId xmlns:a16="http://schemas.microsoft.com/office/drawing/2014/main" xmlns="" id="{BAF13379-D48A-4989-B5A9-701D4311E2C7}"/>
               </a:ext>
             </a:extLst>
           </p:cNvPr>
@@ -8284,7 +8881,7 @@
           <p:cNvPr id="22" name="직사각형 21">
             <a:extLst>
               <a:ext uri="{FF2B5EF4-FFF2-40B4-BE49-F238E27FC236}">
-                <a16:creationId xmlns:a16="http://schemas.microsoft.com/office/drawing/2014/main" id="{CA3240FE-D196-41C9-8310-0D7D91FDE6B8}"/>
+                <a16:creationId xmlns:a16="http://schemas.microsoft.com/office/drawing/2014/main" xmlns="" id="{CA3240FE-D196-41C9-8310-0D7D91FDE6B8}"/>
               </a:ext>
             </a:extLst>
           </p:cNvPr>
@@ -8342,7 +8939,7 @@
           <p:cNvPr id="23" name="직사각형 22">
             <a:extLst>
               <a:ext uri="{FF2B5EF4-FFF2-40B4-BE49-F238E27FC236}">
-                <a16:creationId xmlns:a16="http://schemas.microsoft.com/office/drawing/2014/main" id="{DAF3C5F9-C0B1-401B-99F6-B4BEBECED633}"/>
+                <a16:creationId xmlns:a16="http://schemas.microsoft.com/office/drawing/2014/main" xmlns="" id="{DAF3C5F9-C0B1-401B-99F6-B4BEBECED633}"/>
               </a:ext>
             </a:extLst>
           </p:cNvPr>
@@ -8400,7 +8997,7 @@
           <p:cNvPr id="24" name="직사각형 23">
             <a:extLst>
               <a:ext uri="{FF2B5EF4-FFF2-40B4-BE49-F238E27FC236}">
-                <a16:creationId xmlns:a16="http://schemas.microsoft.com/office/drawing/2014/main" id="{FB9EAE7C-FFD4-480A-896A-70FDD791E296}"/>
+                <a16:creationId xmlns:a16="http://schemas.microsoft.com/office/drawing/2014/main" xmlns="" id="{FB9EAE7C-FFD4-480A-896A-70FDD791E296}"/>
               </a:ext>
             </a:extLst>
           </p:cNvPr>
@@ -8458,7 +9055,7 @@
           <p:cNvPr id="25" name="TextBox 24">
             <a:extLst>
               <a:ext uri="{FF2B5EF4-FFF2-40B4-BE49-F238E27FC236}">
-                <a16:creationId xmlns:a16="http://schemas.microsoft.com/office/drawing/2014/main" id="{F394ACC3-1090-4441-B7D7-8F107EF46302}"/>
+                <a16:creationId xmlns:a16="http://schemas.microsoft.com/office/drawing/2014/main" xmlns="" id="{F394ACC3-1090-4441-B7D7-8F107EF46302}"/>
               </a:ext>
             </a:extLst>
           </p:cNvPr>
@@ -8608,7 +9205,7 @@
           <p:cNvPr id="26" name="직사각형 25">
             <a:extLst>
               <a:ext uri="{FF2B5EF4-FFF2-40B4-BE49-F238E27FC236}">
-                <a16:creationId xmlns:a16="http://schemas.microsoft.com/office/drawing/2014/main" id="{3F45730B-F2E1-42A3-852A-A9DDF2CCFF9F}"/>
+                <a16:creationId xmlns:a16="http://schemas.microsoft.com/office/drawing/2014/main" xmlns="" id="{3F45730B-F2E1-42A3-852A-A9DDF2CCFF9F}"/>
               </a:ext>
             </a:extLst>
           </p:cNvPr>
@@ -8666,7 +9263,7 @@
           <p:cNvPr id="27" name="직사각형 26">
             <a:extLst>
               <a:ext uri="{FF2B5EF4-FFF2-40B4-BE49-F238E27FC236}">
-                <a16:creationId xmlns:a16="http://schemas.microsoft.com/office/drawing/2014/main" id="{96A454B5-D595-491D-AF2F-9807A51C88B7}"/>
+                <a16:creationId xmlns:a16="http://schemas.microsoft.com/office/drawing/2014/main" xmlns="" id="{96A454B5-D595-491D-AF2F-9807A51C88B7}"/>
               </a:ext>
             </a:extLst>
           </p:cNvPr>
@@ -8724,7 +9321,7 @@
           <p:cNvPr id="28" name="직사각형 27">
             <a:extLst>
               <a:ext uri="{FF2B5EF4-FFF2-40B4-BE49-F238E27FC236}">
-                <a16:creationId xmlns:a16="http://schemas.microsoft.com/office/drawing/2014/main" id="{C0EA6BD9-45DF-4263-BC06-B27AD246AA48}"/>
+                <a16:creationId xmlns:a16="http://schemas.microsoft.com/office/drawing/2014/main" xmlns="" id="{C0EA6BD9-45DF-4263-BC06-B27AD246AA48}"/>
               </a:ext>
             </a:extLst>
           </p:cNvPr>
@@ -8782,7 +9379,7 @@
           <p:cNvPr id="29" name="이등변 삼각형 28">
             <a:extLst>
               <a:ext uri="{FF2B5EF4-FFF2-40B4-BE49-F238E27FC236}">
-                <a16:creationId xmlns:a16="http://schemas.microsoft.com/office/drawing/2014/main" id="{19FDE23D-C599-4963-BAB9-70C361F18577}"/>
+                <a16:creationId xmlns:a16="http://schemas.microsoft.com/office/drawing/2014/main" xmlns="" id="{19FDE23D-C599-4963-BAB9-70C361F18577}"/>
               </a:ext>
             </a:extLst>
           </p:cNvPr>
@@ -8830,7 +9427,7 @@
           <p:cNvPr id="16" name="이등변 삼각형 15">
             <a:extLst>
               <a:ext uri="{FF2B5EF4-FFF2-40B4-BE49-F238E27FC236}">
-                <a16:creationId xmlns:a16="http://schemas.microsoft.com/office/drawing/2014/main" id="{5948595C-0AC5-4573-B59A-97740C99B486}"/>
+                <a16:creationId xmlns:a16="http://schemas.microsoft.com/office/drawing/2014/main" xmlns="" id="{5948595C-0AC5-4573-B59A-97740C99B486}"/>
               </a:ext>
             </a:extLst>
           </p:cNvPr>
@@ -8908,7 +9505,7 @@
           <p:cNvPr id="2" name="제목 1">
             <a:extLst>
               <a:ext uri="{FF2B5EF4-FFF2-40B4-BE49-F238E27FC236}">
-                <a16:creationId xmlns:a16="http://schemas.microsoft.com/office/drawing/2014/main" id="{41313CD4-E571-43EE-A625-5C47561F8CBD}"/>
+                <a16:creationId xmlns:a16="http://schemas.microsoft.com/office/drawing/2014/main" xmlns="" id="{41313CD4-E571-43EE-A625-5C47561F8CBD}"/>
               </a:ext>
             </a:extLst>
           </p:cNvPr>
@@ -8941,7 +9538,7 @@
           <p:cNvPr id="4" name="내용 개체 틀 3">
             <a:extLst>
               <a:ext uri="{FF2B5EF4-FFF2-40B4-BE49-F238E27FC236}">
-                <a16:creationId xmlns:a16="http://schemas.microsoft.com/office/drawing/2014/main" id="{AD8EFBB7-2D5E-42F3-A609-8B2DCC9A5AAA}"/>
+                <a16:creationId xmlns:a16="http://schemas.microsoft.com/office/drawing/2014/main" xmlns="" id="{AD8EFBB7-2D5E-42F3-A609-8B2DCC9A5AAA}"/>
               </a:ext>
             </a:extLst>
           </p:cNvPr>
@@ -8971,7 +9568,7 @@
           <p:cNvPr id="5" name="직사각형 4">
             <a:extLst>
               <a:ext uri="{FF2B5EF4-FFF2-40B4-BE49-F238E27FC236}">
-                <a16:creationId xmlns:a16="http://schemas.microsoft.com/office/drawing/2014/main" id="{64582FCA-FBD4-4D74-B2F2-993693D600EA}"/>
+                <a16:creationId xmlns:a16="http://schemas.microsoft.com/office/drawing/2014/main" xmlns="" id="{64582FCA-FBD4-4D74-B2F2-993693D600EA}"/>
               </a:ext>
             </a:extLst>
           </p:cNvPr>
@@ -9027,7 +9624,7 @@
           <p:cNvPr id="6" name="직사각형 5">
             <a:extLst>
               <a:ext uri="{FF2B5EF4-FFF2-40B4-BE49-F238E27FC236}">
-                <a16:creationId xmlns:a16="http://schemas.microsoft.com/office/drawing/2014/main" id="{90C27918-2D27-4D88-A47C-0FC7F96F4D08}"/>
+                <a16:creationId xmlns:a16="http://schemas.microsoft.com/office/drawing/2014/main" xmlns="" id="{90C27918-2D27-4D88-A47C-0FC7F96F4D08}"/>
               </a:ext>
             </a:extLst>
           </p:cNvPr>
@@ -9083,7 +9680,7 @@
           <p:cNvPr id="7" name="직사각형 6">
             <a:extLst>
               <a:ext uri="{FF2B5EF4-FFF2-40B4-BE49-F238E27FC236}">
-                <a16:creationId xmlns:a16="http://schemas.microsoft.com/office/drawing/2014/main" id="{F848F59D-4E2E-454A-ADF1-03352FB237A1}"/>
+                <a16:creationId xmlns:a16="http://schemas.microsoft.com/office/drawing/2014/main" xmlns="" id="{F848F59D-4E2E-454A-ADF1-03352FB237A1}"/>
               </a:ext>
             </a:extLst>
           </p:cNvPr>
@@ -9139,7 +9736,7 @@
           <p:cNvPr id="8" name="TextBox 7">
             <a:extLst>
               <a:ext uri="{FF2B5EF4-FFF2-40B4-BE49-F238E27FC236}">
-                <a16:creationId xmlns:a16="http://schemas.microsoft.com/office/drawing/2014/main" id="{5BE10D8B-42CA-479C-9E80-85B13AAA5BBE}"/>
+                <a16:creationId xmlns:a16="http://schemas.microsoft.com/office/drawing/2014/main" xmlns="" id="{5BE10D8B-42CA-479C-9E80-85B13AAA5BBE}"/>
               </a:ext>
             </a:extLst>
           </p:cNvPr>
@@ -9261,7 +9858,7 @@
           <p:cNvPr id="9" name="이등변 삼각형 8">
             <a:extLst>
               <a:ext uri="{FF2B5EF4-FFF2-40B4-BE49-F238E27FC236}">
-                <a16:creationId xmlns:a16="http://schemas.microsoft.com/office/drawing/2014/main" id="{EECA2CDF-EBE9-4BC2-A35D-92DEB10F7C5B}"/>
+                <a16:creationId xmlns:a16="http://schemas.microsoft.com/office/drawing/2014/main" xmlns="" id="{EECA2CDF-EBE9-4BC2-A35D-92DEB10F7C5B}"/>
               </a:ext>
             </a:extLst>
           </p:cNvPr>
@@ -9307,7 +9904,7 @@
           <p:cNvPr id="10" name="이등변 삼각형 9">
             <a:extLst>
               <a:ext uri="{FF2B5EF4-FFF2-40B4-BE49-F238E27FC236}">
-                <a16:creationId xmlns:a16="http://schemas.microsoft.com/office/drawing/2014/main" id="{4F5F6EB1-6B09-4EF0-BF18-4D225B2C2D16}"/>
+                <a16:creationId xmlns:a16="http://schemas.microsoft.com/office/drawing/2014/main" xmlns="" id="{4F5F6EB1-6B09-4EF0-BF18-4D225B2C2D16}"/>
               </a:ext>
             </a:extLst>
           </p:cNvPr>
@@ -9383,7 +9980,7 @@
           <p:cNvPr id="2" name="제목 1">
             <a:extLst>
               <a:ext uri="{FF2B5EF4-FFF2-40B4-BE49-F238E27FC236}">
-                <a16:creationId xmlns:a16="http://schemas.microsoft.com/office/drawing/2014/main" id="{FADA963E-F77B-49EE-B198-BCBC60F5CA7B}"/>
+                <a16:creationId xmlns:a16="http://schemas.microsoft.com/office/drawing/2014/main" xmlns="" id="{FADA963E-F77B-49EE-B198-BCBC60F5CA7B}"/>
               </a:ext>
             </a:extLst>
           </p:cNvPr>
@@ -9416,7 +10013,7 @@
           <p:cNvPr id="4" name="내용 개체 틀 3">
             <a:extLst>
               <a:ext uri="{FF2B5EF4-FFF2-40B4-BE49-F238E27FC236}">
-                <a16:creationId xmlns:a16="http://schemas.microsoft.com/office/drawing/2014/main" id="{0DC64D5B-DDF0-41C9-BAD5-26A56AC585DD}"/>
+                <a16:creationId xmlns:a16="http://schemas.microsoft.com/office/drawing/2014/main" xmlns="" id="{0DC64D5B-DDF0-41C9-BAD5-26A56AC585DD}"/>
               </a:ext>
             </a:extLst>
           </p:cNvPr>
@@ -9446,7 +10043,7 @@
           <p:cNvPr id="5" name="직사각형 4">
             <a:extLst>
               <a:ext uri="{FF2B5EF4-FFF2-40B4-BE49-F238E27FC236}">
-                <a16:creationId xmlns:a16="http://schemas.microsoft.com/office/drawing/2014/main" id="{D3C6EF9E-E8AB-4189-A495-17FA36C51FF0}"/>
+                <a16:creationId xmlns:a16="http://schemas.microsoft.com/office/drawing/2014/main" xmlns="" id="{D3C6EF9E-E8AB-4189-A495-17FA36C51FF0}"/>
               </a:ext>
             </a:extLst>
           </p:cNvPr>
@@ -9502,7 +10099,7 @@
           <p:cNvPr id="6" name="직사각형 5">
             <a:extLst>
               <a:ext uri="{FF2B5EF4-FFF2-40B4-BE49-F238E27FC236}">
-                <a16:creationId xmlns:a16="http://schemas.microsoft.com/office/drawing/2014/main" id="{A84BB32B-035F-4A1D-ABF4-A988EF6A1BA3}"/>
+                <a16:creationId xmlns:a16="http://schemas.microsoft.com/office/drawing/2014/main" xmlns="" id="{A84BB32B-035F-4A1D-ABF4-A988EF6A1BA3}"/>
               </a:ext>
             </a:extLst>
           </p:cNvPr>
@@ -9558,7 +10155,7 @@
           <p:cNvPr id="7" name="직사각형 6">
             <a:extLst>
               <a:ext uri="{FF2B5EF4-FFF2-40B4-BE49-F238E27FC236}">
-                <a16:creationId xmlns:a16="http://schemas.microsoft.com/office/drawing/2014/main" id="{4199F35B-CF20-4DFD-9560-535A35B7C6F5}"/>
+                <a16:creationId xmlns:a16="http://schemas.microsoft.com/office/drawing/2014/main" xmlns="" id="{4199F35B-CF20-4DFD-9560-535A35B7C6F5}"/>
               </a:ext>
             </a:extLst>
           </p:cNvPr>
@@ -9614,7 +10211,7 @@
           <p:cNvPr id="8" name="직사각형 7">
             <a:extLst>
               <a:ext uri="{FF2B5EF4-FFF2-40B4-BE49-F238E27FC236}">
-                <a16:creationId xmlns:a16="http://schemas.microsoft.com/office/drawing/2014/main" id="{9D0A0CCB-E7EE-4F28-ADF0-39C0248C4EB5}"/>
+                <a16:creationId xmlns:a16="http://schemas.microsoft.com/office/drawing/2014/main" xmlns="" id="{9D0A0CCB-E7EE-4F28-ADF0-39C0248C4EB5}"/>
               </a:ext>
             </a:extLst>
           </p:cNvPr>
@@ -9670,7 +10267,7 @@
           <p:cNvPr id="10" name="직사각형 9">
             <a:extLst>
               <a:ext uri="{FF2B5EF4-FFF2-40B4-BE49-F238E27FC236}">
-                <a16:creationId xmlns:a16="http://schemas.microsoft.com/office/drawing/2014/main" id="{57F20438-5447-4573-BEBD-9653F801E3F8}"/>
+                <a16:creationId xmlns:a16="http://schemas.microsoft.com/office/drawing/2014/main" xmlns="" id="{57F20438-5447-4573-BEBD-9653F801E3F8}"/>
               </a:ext>
             </a:extLst>
           </p:cNvPr>
@@ -9726,7 +10323,7 @@
           <p:cNvPr id="11" name="직사각형 10">
             <a:extLst>
               <a:ext uri="{FF2B5EF4-FFF2-40B4-BE49-F238E27FC236}">
-                <a16:creationId xmlns:a16="http://schemas.microsoft.com/office/drawing/2014/main" id="{6E654F82-B47B-4490-8D67-92463A6B4BA2}"/>
+                <a16:creationId xmlns:a16="http://schemas.microsoft.com/office/drawing/2014/main" xmlns="" id="{6E654F82-B47B-4490-8D67-92463A6B4BA2}"/>
               </a:ext>
             </a:extLst>
           </p:cNvPr>
@@ -9782,7 +10379,7 @@
           <p:cNvPr id="12" name="직사각형 11">
             <a:extLst>
               <a:ext uri="{FF2B5EF4-FFF2-40B4-BE49-F238E27FC236}">
-                <a16:creationId xmlns:a16="http://schemas.microsoft.com/office/drawing/2014/main" id="{B59C0136-6A19-469D-AF93-B79763E036C6}"/>
+                <a16:creationId xmlns:a16="http://schemas.microsoft.com/office/drawing/2014/main" xmlns="" id="{B59C0136-6A19-469D-AF93-B79763E036C6}"/>
               </a:ext>
             </a:extLst>
           </p:cNvPr>
@@ -9838,7 +10435,7 @@
           <p:cNvPr id="13" name="타원 12">
             <a:extLst>
               <a:ext uri="{FF2B5EF4-FFF2-40B4-BE49-F238E27FC236}">
-                <a16:creationId xmlns:a16="http://schemas.microsoft.com/office/drawing/2014/main" id="{56D09819-B0A5-47EC-9147-1F1DA32F7F74}"/>
+                <a16:creationId xmlns:a16="http://schemas.microsoft.com/office/drawing/2014/main" xmlns="" id="{56D09819-B0A5-47EC-9147-1F1DA32F7F74}"/>
               </a:ext>
             </a:extLst>
           </p:cNvPr>
@@ -9884,7 +10481,7 @@
           <p:cNvPr id="14" name="타원 13">
             <a:extLst>
               <a:ext uri="{FF2B5EF4-FFF2-40B4-BE49-F238E27FC236}">
-                <a16:creationId xmlns:a16="http://schemas.microsoft.com/office/drawing/2014/main" id="{918C3A79-D717-40DF-B9DB-94169E23D823}"/>
+                <a16:creationId xmlns:a16="http://schemas.microsoft.com/office/drawing/2014/main" xmlns="" id="{918C3A79-D717-40DF-B9DB-94169E23D823}"/>
               </a:ext>
             </a:extLst>
           </p:cNvPr>
@@ -9930,7 +10527,7 @@
           <p:cNvPr id="15" name="타원 14">
             <a:extLst>
               <a:ext uri="{FF2B5EF4-FFF2-40B4-BE49-F238E27FC236}">
-                <a16:creationId xmlns:a16="http://schemas.microsoft.com/office/drawing/2014/main" id="{D14A3DA4-6A21-4DE2-BEB9-8BB8A3B02DAA}"/>
+                <a16:creationId xmlns:a16="http://schemas.microsoft.com/office/drawing/2014/main" xmlns="" id="{D14A3DA4-6A21-4DE2-BEB9-8BB8A3B02DAA}"/>
               </a:ext>
             </a:extLst>
           </p:cNvPr>
@@ -9976,7 +10573,7 @@
           <p:cNvPr id="16" name="타원 15">
             <a:extLst>
               <a:ext uri="{FF2B5EF4-FFF2-40B4-BE49-F238E27FC236}">
-                <a16:creationId xmlns:a16="http://schemas.microsoft.com/office/drawing/2014/main" id="{558F4AC8-FA4C-49C5-87D7-FD621AEFBC13}"/>
+                <a16:creationId xmlns:a16="http://schemas.microsoft.com/office/drawing/2014/main" xmlns="" id="{558F4AC8-FA4C-49C5-87D7-FD621AEFBC13}"/>
               </a:ext>
             </a:extLst>
           </p:cNvPr>
@@ -10022,7 +10619,7 @@
           <p:cNvPr id="17" name="타원 16">
             <a:extLst>
               <a:ext uri="{FF2B5EF4-FFF2-40B4-BE49-F238E27FC236}">
-                <a16:creationId xmlns:a16="http://schemas.microsoft.com/office/drawing/2014/main" id="{3051631D-C430-4BFD-A9C3-C188C699DB61}"/>
+                <a16:creationId xmlns:a16="http://schemas.microsoft.com/office/drawing/2014/main" xmlns="" id="{3051631D-C430-4BFD-A9C3-C188C699DB61}"/>
               </a:ext>
             </a:extLst>
           </p:cNvPr>
@@ -10068,7 +10665,7 @@
           <p:cNvPr id="18" name="타원 17">
             <a:extLst>
               <a:ext uri="{FF2B5EF4-FFF2-40B4-BE49-F238E27FC236}">
-                <a16:creationId xmlns:a16="http://schemas.microsoft.com/office/drawing/2014/main" id="{16BB8330-7B73-4E8E-A992-69EF251A6221}"/>
+                <a16:creationId xmlns:a16="http://schemas.microsoft.com/office/drawing/2014/main" xmlns="" id="{16BB8330-7B73-4E8E-A992-69EF251A6221}"/>
               </a:ext>
             </a:extLst>
           </p:cNvPr>
@@ -10114,7 +10711,7 @@
           <p:cNvPr id="19" name="TextBox 18">
             <a:extLst>
               <a:ext uri="{FF2B5EF4-FFF2-40B4-BE49-F238E27FC236}">
-                <a16:creationId xmlns:a16="http://schemas.microsoft.com/office/drawing/2014/main" id="{CBE37928-685A-423A-89FF-EFBD513E3801}"/>
+                <a16:creationId xmlns:a16="http://schemas.microsoft.com/office/drawing/2014/main" xmlns="" id="{CBE37928-685A-423A-89FF-EFBD513E3801}"/>
               </a:ext>
             </a:extLst>
           </p:cNvPr>
@@ -10269,7 +10866,7 @@
           <p:cNvPr id="20" name="이등변 삼각형 19">
             <a:extLst>
               <a:ext uri="{FF2B5EF4-FFF2-40B4-BE49-F238E27FC236}">
-                <a16:creationId xmlns:a16="http://schemas.microsoft.com/office/drawing/2014/main" id="{825B801C-D17B-4BE2-BDCE-A9A86976A3E0}"/>
+                <a16:creationId xmlns:a16="http://schemas.microsoft.com/office/drawing/2014/main" xmlns="" id="{825B801C-D17B-4BE2-BDCE-A9A86976A3E0}"/>
               </a:ext>
             </a:extLst>
           </p:cNvPr>
@@ -10315,7 +10912,7 @@
           <p:cNvPr id="21" name="이등변 삼각형 20">
             <a:extLst>
               <a:ext uri="{FF2B5EF4-FFF2-40B4-BE49-F238E27FC236}">
-                <a16:creationId xmlns:a16="http://schemas.microsoft.com/office/drawing/2014/main" id="{E18465E8-FEAE-4300-81F0-FD9BE33F21D5}"/>
+                <a16:creationId xmlns:a16="http://schemas.microsoft.com/office/drawing/2014/main" xmlns="" id="{E18465E8-FEAE-4300-81F0-FD9BE33F21D5}"/>
               </a:ext>
             </a:extLst>
           </p:cNvPr>

</xml_diff>